<commit_message>
Write final presentation slides
</commit_message>
<xml_diff>
--- a/final_presentation.pptx
+++ b/final_presentation.pptx
@@ -5,15 +5,30 @@
     <p:sldMasterId id="2147483648" r:id="rId1"/>
   </p:sldMasterIdLst>
   <p:notesMasterIdLst>
-    <p:notesMasterId r:id="rId8"/>
+    <p:notesMasterId r:id="rId23"/>
   </p:notesMasterIdLst>
   <p:sldIdLst>
     <p:sldId id="257" r:id="rId2"/>
     <p:sldId id="258" r:id="rId3"/>
-    <p:sldId id="259" r:id="rId4"/>
-    <p:sldId id="260" r:id="rId5"/>
-    <p:sldId id="261" r:id="rId6"/>
-    <p:sldId id="262" r:id="rId7"/>
+    <p:sldId id="260" r:id="rId4"/>
+    <p:sldId id="268" r:id="rId5"/>
+    <p:sldId id="259" r:id="rId6"/>
+    <p:sldId id="263" r:id="rId7"/>
+    <p:sldId id="265" r:id="rId8"/>
+    <p:sldId id="266" r:id="rId9"/>
+    <p:sldId id="267" r:id="rId10"/>
+    <p:sldId id="264" r:id="rId11"/>
+    <p:sldId id="284" r:id="rId12"/>
+    <p:sldId id="285" r:id="rId13"/>
+    <p:sldId id="269" r:id="rId14"/>
+    <p:sldId id="275" r:id="rId15"/>
+    <p:sldId id="277" r:id="rId16"/>
+    <p:sldId id="270" r:id="rId17"/>
+    <p:sldId id="278" r:id="rId18"/>
+    <p:sldId id="279" r:id="rId19"/>
+    <p:sldId id="274" r:id="rId20"/>
+    <p:sldId id="276" r:id="rId21"/>
+    <p:sldId id="286" r:id="rId22"/>
   </p:sldIdLst>
   <p:sldSz cx="12192000" cy="6858000"/>
   <p:notesSz cx="6858000" cy="9144000"/>
@@ -112,6 +127,11 @@
       </a:defRPr>
     </a:lvl9pPr>
   </p:defaultTextStyle>
+  <p:extLst>
+    <p:ext uri="{EFAFB233-063F-42B5-8137-9DF3F51BA10A}">
+      <p15:sldGuideLst xmlns:p15="http://schemas.microsoft.com/office/powerpoint/2012/main"/>
+    </p:ext>
+  </p:extLst>
 </p:presentation>
 </file>
 
@@ -197,7 +217,7 @@
           <a:p>
             <a:fld id="{2DE41C12-4B73-439E-A775-7F8A7EF053F4}" type="datetimeFigureOut">
               <a:rPr lang="en-CA" smtClean="0"/>
-              <a:t>2024-04-02</a:t>
+              <a:t>2024-04-03</a:t>
             </a:fld>
             <a:endParaRPr lang="en-CA"/>
           </a:p>
@@ -699,7 +719,7 @@
           <a:p>
             <a:fld id="{7644D46B-488D-42EE-9E19-33BB657A5107}" type="datetimeFigureOut">
               <a:rPr lang="en-CA" smtClean="0"/>
-              <a:t>2024-04-02</a:t>
+              <a:t>2024-04-03</a:t>
             </a:fld>
             <a:endParaRPr lang="en-CA"/>
           </a:p>
@@ -899,7 +919,7 @@
           <a:p>
             <a:fld id="{7644D46B-488D-42EE-9E19-33BB657A5107}" type="datetimeFigureOut">
               <a:rPr lang="en-CA" smtClean="0"/>
-              <a:t>2024-04-02</a:t>
+              <a:t>2024-04-03</a:t>
             </a:fld>
             <a:endParaRPr lang="en-CA"/>
           </a:p>
@@ -1109,7 +1129,7 @@
           <a:p>
             <a:fld id="{7644D46B-488D-42EE-9E19-33BB657A5107}" type="datetimeFigureOut">
               <a:rPr lang="en-CA" smtClean="0"/>
-              <a:t>2024-04-02</a:t>
+              <a:t>2024-04-03</a:t>
             </a:fld>
             <a:endParaRPr lang="en-CA"/>
           </a:p>
@@ -1309,7 +1329,7 @@
           <a:p>
             <a:fld id="{7644D46B-488D-42EE-9E19-33BB657A5107}" type="datetimeFigureOut">
               <a:rPr lang="en-CA" smtClean="0"/>
-              <a:t>2024-04-02</a:t>
+              <a:t>2024-04-03</a:t>
             </a:fld>
             <a:endParaRPr lang="en-CA"/>
           </a:p>
@@ -1585,7 +1605,7 @@
           <a:p>
             <a:fld id="{7644D46B-488D-42EE-9E19-33BB657A5107}" type="datetimeFigureOut">
               <a:rPr lang="en-CA" smtClean="0"/>
-              <a:t>2024-04-02</a:t>
+              <a:t>2024-04-03</a:t>
             </a:fld>
             <a:endParaRPr lang="en-CA"/>
           </a:p>
@@ -1853,7 +1873,7 @@
           <a:p>
             <a:fld id="{7644D46B-488D-42EE-9E19-33BB657A5107}" type="datetimeFigureOut">
               <a:rPr lang="en-CA" smtClean="0"/>
-              <a:t>2024-04-02</a:t>
+              <a:t>2024-04-03</a:t>
             </a:fld>
             <a:endParaRPr lang="en-CA"/>
           </a:p>
@@ -2268,7 +2288,7 @@
           <a:p>
             <a:fld id="{7644D46B-488D-42EE-9E19-33BB657A5107}" type="datetimeFigureOut">
               <a:rPr lang="en-CA" smtClean="0"/>
-              <a:t>2024-04-02</a:t>
+              <a:t>2024-04-03</a:t>
             </a:fld>
             <a:endParaRPr lang="en-CA"/>
           </a:p>
@@ -2410,7 +2430,7 @@
           <a:p>
             <a:fld id="{7644D46B-488D-42EE-9E19-33BB657A5107}" type="datetimeFigureOut">
               <a:rPr lang="en-CA" smtClean="0"/>
-              <a:t>2024-04-02</a:t>
+              <a:t>2024-04-03</a:t>
             </a:fld>
             <a:endParaRPr lang="en-CA"/>
           </a:p>
@@ -2523,7 +2543,7 @@
           <a:p>
             <a:fld id="{7644D46B-488D-42EE-9E19-33BB657A5107}" type="datetimeFigureOut">
               <a:rPr lang="en-CA" smtClean="0"/>
-              <a:t>2024-04-02</a:t>
+              <a:t>2024-04-03</a:t>
             </a:fld>
             <a:endParaRPr lang="en-CA"/>
           </a:p>
@@ -2836,7 +2856,7 @@
           <a:p>
             <a:fld id="{7644D46B-488D-42EE-9E19-33BB657A5107}" type="datetimeFigureOut">
               <a:rPr lang="en-CA" smtClean="0"/>
-              <a:t>2024-04-02</a:t>
+              <a:t>2024-04-03</a:t>
             </a:fld>
             <a:endParaRPr lang="en-CA"/>
           </a:p>
@@ -3125,7 +3145,7 @@
           <a:p>
             <a:fld id="{7644D46B-488D-42EE-9E19-33BB657A5107}" type="datetimeFigureOut">
               <a:rPr lang="en-CA" smtClean="0"/>
-              <a:t>2024-04-02</a:t>
+              <a:t>2024-04-03</a:t>
             </a:fld>
             <a:endParaRPr lang="en-CA"/>
           </a:p>
@@ -3368,7 +3388,7 @@
           <a:p>
             <a:fld id="{7644D46B-488D-42EE-9E19-33BB657A5107}" type="datetimeFigureOut">
               <a:rPr lang="en-CA" smtClean="0"/>
-              <a:t>2024-04-02</a:t>
+              <a:t>2024-04-03</a:t>
             </a:fld>
             <a:endParaRPr lang="en-CA"/>
           </a:p>
@@ -3900,6 +3920,1486 @@
 </p:sld>
 </file>
 
+<file path=ppt/slides/slide10.xml><?xml version="1.0" encoding="utf-8"?>
+<p:sld xmlns:a="http://schemas.openxmlformats.org/drawingml/2006/main" xmlns:r="http://schemas.openxmlformats.org/officeDocument/2006/relationships" xmlns:p="http://schemas.openxmlformats.org/presentationml/2006/main">
+  <p:cSld>
+    <p:spTree>
+      <p:nvGrpSpPr>
+        <p:cNvPr id="1" name=""/>
+        <p:cNvGrpSpPr/>
+        <p:nvPr/>
+      </p:nvGrpSpPr>
+      <p:grpSpPr>
+        <a:xfrm>
+          <a:off x="0" y="0"/>
+          <a:ext cx="0" cy="0"/>
+          <a:chOff x="0" y="0"/>
+          <a:chExt cx="0" cy="0"/>
+        </a:xfrm>
+      </p:grpSpPr>
+      <p:sp>
+        <p:nvSpPr>
+          <p:cNvPr id="2" name="标题 1">
+            <a:extLst>
+              <a:ext uri="{FF2B5EF4-FFF2-40B4-BE49-F238E27FC236}">
+                <a16:creationId xmlns:a16="http://schemas.microsoft.com/office/drawing/2014/main" id="{35E8D42D-C4C3-AC05-8826-6AF0E4B3CB8C}"/>
+              </a:ext>
+            </a:extLst>
+          </p:cNvPr>
+          <p:cNvSpPr>
+            <a:spLocks noGrp="1"/>
+          </p:cNvSpPr>
+          <p:nvPr>
+            <p:ph type="title"/>
+          </p:nvPr>
+        </p:nvSpPr>
+        <p:spPr/>
+        <p:txBody>
+          <a:bodyPr/>
+          <a:lstStyle/>
+          <a:p>
+            <a:r>
+              <a:rPr lang="en-US" dirty="0"/>
+              <a:t>Results</a:t>
+            </a:r>
+            <a:endParaRPr lang="en-CA" dirty="0"/>
+          </a:p>
+        </p:txBody>
+      </p:sp>
+      <p:sp>
+        <p:nvSpPr>
+          <p:cNvPr id="3" name="内容占位符 2">
+            <a:extLst>
+              <a:ext uri="{FF2B5EF4-FFF2-40B4-BE49-F238E27FC236}">
+                <a16:creationId xmlns:a16="http://schemas.microsoft.com/office/drawing/2014/main" id="{C7C92FAA-9C16-C740-48E7-9298C7C6AB58}"/>
+              </a:ext>
+            </a:extLst>
+          </p:cNvPr>
+          <p:cNvSpPr>
+            <a:spLocks noGrp="1"/>
+          </p:cNvSpPr>
+          <p:nvPr>
+            <p:ph idx="1"/>
+          </p:nvPr>
+        </p:nvSpPr>
+        <p:spPr/>
+        <p:txBody>
+          <a:bodyPr/>
+          <a:lstStyle/>
+          <a:p>
+            <a:r>
+              <a:rPr lang="en-US" dirty="0"/>
+              <a:t>We’ve ran test on 4 LLMs</a:t>
+            </a:r>
+          </a:p>
+          <a:p>
+            <a:pPr lvl="1"/>
+            <a:endParaRPr lang="en-US" dirty="0"/>
+          </a:p>
+          <a:p>
+            <a:pPr marL="457200" lvl="1" indent="0">
+              <a:buNone/>
+            </a:pPr>
+            <a:r>
+              <a:rPr lang="en-US" dirty="0"/>
+              <a:t>ChatGpt-3.5</a:t>
+            </a:r>
+          </a:p>
+          <a:p>
+            <a:pPr lvl="1"/>
+            <a:endParaRPr lang="en-US" dirty="0"/>
+          </a:p>
+          <a:p>
+            <a:pPr marL="457200" lvl="1" indent="0">
+              <a:buNone/>
+            </a:pPr>
+            <a:r>
+              <a:rPr lang="en-US" dirty="0"/>
+              <a:t>GPT-4</a:t>
+            </a:r>
+          </a:p>
+          <a:p>
+            <a:pPr lvl="1"/>
+            <a:endParaRPr lang="en-US" dirty="0"/>
+          </a:p>
+          <a:p>
+            <a:pPr marL="457200" lvl="1" indent="0">
+              <a:buNone/>
+            </a:pPr>
+            <a:r>
+              <a:rPr lang="en-US" dirty="0"/>
+              <a:t>Ernie-3.5</a:t>
+            </a:r>
+          </a:p>
+          <a:p>
+            <a:pPr lvl="1"/>
+            <a:endParaRPr lang="en-US" dirty="0"/>
+          </a:p>
+          <a:p>
+            <a:pPr marL="457200" lvl="1" indent="0">
+              <a:buNone/>
+            </a:pPr>
+            <a:r>
+              <a:rPr lang="en-US" dirty="0"/>
+              <a:t>Ernie-4.0</a:t>
+            </a:r>
+            <a:endParaRPr lang="en-CA" dirty="0"/>
+          </a:p>
+        </p:txBody>
+      </p:sp>
+      <p:pic>
+        <p:nvPicPr>
+          <p:cNvPr id="5" name="图片 4">
+            <a:extLst>
+              <a:ext uri="{FF2B5EF4-FFF2-40B4-BE49-F238E27FC236}">
+                <a16:creationId xmlns:a16="http://schemas.microsoft.com/office/drawing/2014/main" id="{53F9933B-F1DA-0499-B6B2-B775B7E23CC0}"/>
+              </a:ext>
+            </a:extLst>
+          </p:cNvPr>
+          <p:cNvPicPr>
+            <a:picLocks noChangeAspect="1"/>
+          </p:cNvPicPr>
+          <p:nvPr/>
+        </p:nvPicPr>
+        <p:blipFill>
+          <a:blip r:embed="rId2"/>
+          <a:stretch>
+            <a:fillRect/>
+          </a:stretch>
+        </p:blipFill>
+        <p:spPr>
+          <a:xfrm>
+            <a:off x="3608943" y="4164300"/>
+            <a:ext cx="1542293" cy="570259"/>
+          </a:xfrm>
+          <a:prstGeom prst="rect">
+            <a:avLst/>
+          </a:prstGeom>
+        </p:spPr>
+      </p:pic>
+      <p:pic>
+        <p:nvPicPr>
+          <p:cNvPr id="7" name="图片 6">
+            <a:extLst>
+              <a:ext uri="{FF2B5EF4-FFF2-40B4-BE49-F238E27FC236}">
+                <a16:creationId xmlns:a16="http://schemas.microsoft.com/office/drawing/2014/main" id="{F572CE35-F289-BB41-9071-9CDF44B783D7}"/>
+              </a:ext>
+            </a:extLst>
+          </p:cNvPr>
+          <p:cNvPicPr>
+            <a:picLocks noChangeAspect="1"/>
+          </p:cNvPicPr>
+          <p:nvPr/>
+        </p:nvPicPr>
+        <p:blipFill>
+          <a:blip r:embed="rId3"/>
+          <a:stretch>
+            <a:fillRect/>
+          </a:stretch>
+        </p:blipFill>
+        <p:spPr>
+          <a:xfrm>
+            <a:off x="3608943" y="4975832"/>
+            <a:ext cx="1696520" cy="570259"/>
+          </a:xfrm>
+          <a:prstGeom prst="rect">
+            <a:avLst/>
+          </a:prstGeom>
+        </p:spPr>
+      </p:pic>
+      <p:pic>
+        <p:nvPicPr>
+          <p:cNvPr id="9" name="图片 8">
+            <a:extLst>
+              <a:ext uri="{FF2B5EF4-FFF2-40B4-BE49-F238E27FC236}">
+                <a16:creationId xmlns:a16="http://schemas.microsoft.com/office/drawing/2014/main" id="{1C97FB5D-C32E-9254-8427-3ACDFD896543}"/>
+              </a:ext>
+            </a:extLst>
+          </p:cNvPr>
+          <p:cNvPicPr>
+            <a:picLocks noChangeAspect="1"/>
+          </p:cNvPicPr>
+          <p:nvPr/>
+        </p:nvPicPr>
+        <p:blipFill>
+          <a:blip r:embed="rId4"/>
+          <a:stretch>
+            <a:fillRect/>
+          </a:stretch>
+        </p:blipFill>
+        <p:spPr>
+          <a:xfrm>
+            <a:off x="3520481" y="3296861"/>
+            <a:ext cx="2202376" cy="570259"/>
+          </a:xfrm>
+          <a:prstGeom prst="rect">
+            <a:avLst/>
+          </a:prstGeom>
+        </p:spPr>
+      </p:pic>
+      <p:pic>
+        <p:nvPicPr>
+          <p:cNvPr id="11" name="图片 10">
+            <a:extLst>
+              <a:ext uri="{FF2B5EF4-FFF2-40B4-BE49-F238E27FC236}">
+                <a16:creationId xmlns:a16="http://schemas.microsoft.com/office/drawing/2014/main" id="{B518928B-49A6-D304-1055-F5020DC5C739}"/>
+              </a:ext>
+            </a:extLst>
+          </p:cNvPr>
+          <p:cNvPicPr>
+            <a:picLocks noChangeAspect="1"/>
+          </p:cNvPicPr>
+          <p:nvPr/>
+        </p:nvPicPr>
+        <p:blipFill>
+          <a:blip r:embed="rId5"/>
+          <a:stretch>
+            <a:fillRect/>
+          </a:stretch>
+        </p:blipFill>
+        <p:spPr>
+          <a:xfrm>
+            <a:off x="3547983" y="2552632"/>
+            <a:ext cx="2202376" cy="585954"/>
+          </a:xfrm>
+          <a:prstGeom prst="rect">
+            <a:avLst/>
+          </a:prstGeom>
+        </p:spPr>
+      </p:pic>
+    </p:spTree>
+    <p:extLst>
+      <p:ext uri="{BB962C8B-B14F-4D97-AF65-F5344CB8AC3E}">
+        <p14:creationId xmlns:p14="http://schemas.microsoft.com/office/powerpoint/2010/main" val="2398495758"/>
+      </p:ext>
+    </p:extLst>
+  </p:cSld>
+  <p:clrMapOvr>
+    <a:masterClrMapping/>
+  </p:clrMapOvr>
+</p:sld>
+</file>
+
+<file path=ppt/slides/slide11.xml><?xml version="1.0" encoding="utf-8"?>
+<p:sld xmlns:a="http://schemas.openxmlformats.org/drawingml/2006/main" xmlns:r="http://schemas.openxmlformats.org/officeDocument/2006/relationships" xmlns:p="http://schemas.openxmlformats.org/presentationml/2006/main">
+  <p:cSld>
+    <p:spTree>
+      <p:nvGrpSpPr>
+        <p:cNvPr id="1" name=""/>
+        <p:cNvGrpSpPr/>
+        <p:nvPr/>
+      </p:nvGrpSpPr>
+      <p:grpSpPr>
+        <a:xfrm>
+          <a:off x="0" y="0"/>
+          <a:ext cx="0" cy="0"/>
+          <a:chOff x="0" y="0"/>
+          <a:chExt cx="0" cy="0"/>
+        </a:xfrm>
+      </p:grpSpPr>
+      <p:sp>
+        <p:nvSpPr>
+          <p:cNvPr id="2" name="标题 1">
+            <a:extLst>
+              <a:ext uri="{FF2B5EF4-FFF2-40B4-BE49-F238E27FC236}">
+                <a16:creationId xmlns:a16="http://schemas.microsoft.com/office/drawing/2014/main" id="{FF6596A4-C9B9-1906-5351-A102CD703A9B}"/>
+              </a:ext>
+            </a:extLst>
+          </p:cNvPr>
+          <p:cNvSpPr>
+            <a:spLocks noGrp="1"/>
+          </p:cNvSpPr>
+          <p:nvPr>
+            <p:ph type="title"/>
+          </p:nvPr>
+        </p:nvSpPr>
+        <p:spPr/>
+        <p:txBody>
+          <a:bodyPr/>
+          <a:lstStyle/>
+          <a:p>
+            <a:r>
+              <a:rPr lang="en-US" dirty="0"/>
+              <a:t>Results</a:t>
+            </a:r>
+            <a:endParaRPr lang="en-CA" dirty="0"/>
+          </a:p>
+        </p:txBody>
+      </p:sp>
+      <p:sp>
+        <p:nvSpPr>
+          <p:cNvPr id="3" name="内容占位符 2">
+            <a:extLst>
+              <a:ext uri="{FF2B5EF4-FFF2-40B4-BE49-F238E27FC236}">
+                <a16:creationId xmlns:a16="http://schemas.microsoft.com/office/drawing/2014/main" id="{81CEE676-54CC-1590-D2CF-B3A9F100DC03}"/>
+              </a:ext>
+            </a:extLst>
+          </p:cNvPr>
+          <p:cNvSpPr>
+            <a:spLocks noGrp="1"/>
+          </p:cNvSpPr>
+          <p:nvPr>
+            <p:ph idx="1"/>
+          </p:nvPr>
+        </p:nvSpPr>
+        <p:spPr/>
+        <p:txBody>
+          <a:bodyPr/>
+          <a:lstStyle/>
+          <a:p>
+            <a:r>
+              <a:rPr lang="en-US" dirty="0"/>
+              <a:t>How the test goes?</a:t>
+            </a:r>
+          </a:p>
+          <a:p>
+            <a:pPr lvl="1"/>
+            <a:endParaRPr lang="en-US" dirty="0"/>
+          </a:p>
+          <a:p>
+            <a:pPr lvl="1"/>
+            <a:r>
+              <a:rPr lang="en-US" dirty="0"/>
+              <a:t>Zero-shot question answering</a:t>
+            </a:r>
+          </a:p>
+          <a:p>
+            <a:pPr lvl="1"/>
+            <a:endParaRPr lang="en-US" dirty="0"/>
+          </a:p>
+          <a:p>
+            <a:pPr lvl="1"/>
+            <a:r>
+              <a:rPr lang="en-US" dirty="0"/>
+              <a:t>If the correct answer is included in the output, the answer is marked as correct</a:t>
+            </a:r>
+            <a:endParaRPr lang="en-CA" dirty="0"/>
+          </a:p>
+        </p:txBody>
+      </p:sp>
+    </p:spTree>
+    <p:extLst>
+      <p:ext uri="{BB962C8B-B14F-4D97-AF65-F5344CB8AC3E}">
+        <p14:creationId xmlns:p14="http://schemas.microsoft.com/office/powerpoint/2010/main" val="551262604"/>
+      </p:ext>
+    </p:extLst>
+  </p:cSld>
+  <p:clrMapOvr>
+    <a:masterClrMapping/>
+  </p:clrMapOvr>
+</p:sld>
+</file>
+
+<file path=ppt/slides/slide12.xml><?xml version="1.0" encoding="utf-8"?>
+<p:sld xmlns:a="http://schemas.openxmlformats.org/drawingml/2006/main" xmlns:r="http://schemas.openxmlformats.org/officeDocument/2006/relationships" xmlns:p="http://schemas.openxmlformats.org/presentationml/2006/main">
+  <p:cSld>
+    <p:spTree>
+      <p:nvGrpSpPr>
+        <p:cNvPr id="1" name=""/>
+        <p:cNvGrpSpPr/>
+        <p:nvPr/>
+      </p:nvGrpSpPr>
+      <p:grpSpPr>
+        <a:xfrm>
+          <a:off x="0" y="0"/>
+          <a:ext cx="0" cy="0"/>
+          <a:chOff x="0" y="0"/>
+          <a:chExt cx="0" cy="0"/>
+        </a:xfrm>
+      </p:grpSpPr>
+      <p:sp>
+        <p:nvSpPr>
+          <p:cNvPr id="2" name="标题 1">
+            <a:extLst>
+              <a:ext uri="{FF2B5EF4-FFF2-40B4-BE49-F238E27FC236}">
+                <a16:creationId xmlns:a16="http://schemas.microsoft.com/office/drawing/2014/main" id="{D76408D9-3702-E3BF-EB4C-FAB5792454DF}"/>
+              </a:ext>
+            </a:extLst>
+          </p:cNvPr>
+          <p:cNvSpPr>
+            <a:spLocks noGrp="1"/>
+          </p:cNvSpPr>
+          <p:nvPr>
+            <p:ph type="title"/>
+          </p:nvPr>
+        </p:nvSpPr>
+        <p:spPr/>
+        <p:txBody>
+          <a:bodyPr/>
+          <a:lstStyle/>
+          <a:p>
+            <a:r>
+              <a:rPr lang="en-US" dirty="0"/>
+              <a:t>Results</a:t>
+            </a:r>
+            <a:endParaRPr lang="en-CA" dirty="0"/>
+          </a:p>
+        </p:txBody>
+      </p:sp>
+      <p:sp>
+        <p:nvSpPr>
+          <p:cNvPr id="3" name="内容占位符 2">
+            <a:extLst>
+              <a:ext uri="{FF2B5EF4-FFF2-40B4-BE49-F238E27FC236}">
+                <a16:creationId xmlns:a16="http://schemas.microsoft.com/office/drawing/2014/main" id="{724C4E28-DEBB-C736-B87B-B9B9BA99C10E}"/>
+              </a:ext>
+            </a:extLst>
+          </p:cNvPr>
+          <p:cNvSpPr>
+            <a:spLocks noGrp="1"/>
+          </p:cNvSpPr>
+          <p:nvPr>
+            <p:ph idx="1"/>
+          </p:nvPr>
+        </p:nvSpPr>
+        <p:spPr/>
+        <p:txBody>
+          <a:bodyPr/>
+          <a:lstStyle/>
+          <a:p>
+            <a:r>
+              <a:rPr lang="en-US" dirty="0"/>
+              <a:t>How the test goes?</a:t>
+            </a:r>
+            <a:endParaRPr lang="en-CA" dirty="0"/>
+          </a:p>
+        </p:txBody>
+      </p:sp>
+      <p:pic>
+        <p:nvPicPr>
+          <p:cNvPr id="5" name="图片 4">
+            <a:extLst>
+              <a:ext uri="{FF2B5EF4-FFF2-40B4-BE49-F238E27FC236}">
+                <a16:creationId xmlns:a16="http://schemas.microsoft.com/office/drawing/2014/main" id="{365CF4C8-FE9D-1B17-11B2-6070910EC6EC}"/>
+              </a:ext>
+            </a:extLst>
+          </p:cNvPr>
+          <p:cNvPicPr>
+            <a:picLocks noChangeAspect="1"/>
+          </p:cNvPicPr>
+          <p:nvPr/>
+        </p:nvPicPr>
+        <p:blipFill>
+          <a:blip r:embed="rId2">
+            <a:extLst>
+              <a:ext uri="{28A0092B-C50C-407E-A947-70E740481C1C}">
+                <a14:useLocalDpi xmlns:a14="http://schemas.microsoft.com/office/drawing/2010/main" val="0"/>
+              </a:ext>
+            </a:extLst>
+          </a:blip>
+          <a:stretch>
+            <a:fillRect/>
+          </a:stretch>
+        </p:blipFill>
+        <p:spPr>
+          <a:xfrm>
+            <a:off x="5560694" y="2417735"/>
+            <a:ext cx="6057266" cy="4075140"/>
+          </a:xfrm>
+          <a:prstGeom prst="rect">
+            <a:avLst/>
+          </a:prstGeom>
+        </p:spPr>
+      </p:pic>
+      <p:pic>
+        <p:nvPicPr>
+          <p:cNvPr id="7" name="图片 6">
+            <a:extLst>
+              <a:ext uri="{FF2B5EF4-FFF2-40B4-BE49-F238E27FC236}">
+                <a16:creationId xmlns:a16="http://schemas.microsoft.com/office/drawing/2014/main" id="{03E5DA33-34F0-9436-8D07-6825295EC90D}"/>
+              </a:ext>
+            </a:extLst>
+          </p:cNvPr>
+          <p:cNvPicPr>
+            <a:picLocks noChangeAspect="1"/>
+          </p:cNvPicPr>
+          <p:nvPr/>
+        </p:nvPicPr>
+        <p:blipFill>
+          <a:blip r:embed="rId3">
+            <a:extLst>
+              <a:ext uri="{28A0092B-C50C-407E-A947-70E740481C1C}">
+                <a14:useLocalDpi xmlns:a14="http://schemas.microsoft.com/office/drawing/2010/main" val="0"/>
+              </a:ext>
+            </a:extLst>
+          </a:blip>
+          <a:stretch>
+            <a:fillRect/>
+          </a:stretch>
+        </p:blipFill>
+        <p:spPr>
+          <a:xfrm>
+            <a:off x="183742" y="2879090"/>
+            <a:ext cx="6031410" cy="2244407"/>
+          </a:xfrm>
+          <a:prstGeom prst="rect">
+            <a:avLst/>
+          </a:prstGeom>
+        </p:spPr>
+      </p:pic>
+      <p:pic>
+        <p:nvPicPr>
+          <p:cNvPr id="9" name="图片 8">
+            <a:extLst>
+              <a:ext uri="{FF2B5EF4-FFF2-40B4-BE49-F238E27FC236}">
+                <a16:creationId xmlns:a16="http://schemas.microsoft.com/office/drawing/2014/main" id="{265B3798-7B65-6F1F-8903-13187C21EBCA}"/>
+              </a:ext>
+            </a:extLst>
+          </p:cNvPr>
+          <p:cNvPicPr>
+            <a:picLocks noChangeAspect="1"/>
+          </p:cNvPicPr>
+          <p:nvPr/>
+        </p:nvPicPr>
+        <p:blipFill>
+          <a:blip r:embed="rId4"/>
+          <a:stretch>
+            <a:fillRect/>
+          </a:stretch>
+        </p:blipFill>
+        <p:spPr>
+          <a:xfrm>
+            <a:off x="4543280" y="1039658"/>
+            <a:ext cx="6620799" cy="676369"/>
+          </a:xfrm>
+          <a:prstGeom prst="rect">
+            <a:avLst/>
+          </a:prstGeom>
+        </p:spPr>
+      </p:pic>
+    </p:spTree>
+    <p:extLst>
+      <p:ext uri="{BB962C8B-B14F-4D97-AF65-F5344CB8AC3E}">
+        <p14:creationId xmlns:p14="http://schemas.microsoft.com/office/powerpoint/2010/main" val="2097381613"/>
+      </p:ext>
+    </p:extLst>
+  </p:cSld>
+  <p:clrMapOvr>
+    <a:masterClrMapping/>
+  </p:clrMapOvr>
+</p:sld>
+</file>
+
+<file path=ppt/slides/slide13.xml><?xml version="1.0" encoding="utf-8"?>
+<p:sld xmlns:a="http://schemas.openxmlformats.org/drawingml/2006/main" xmlns:r="http://schemas.openxmlformats.org/officeDocument/2006/relationships" xmlns:p="http://schemas.openxmlformats.org/presentationml/2006/main">
+  <p:cSld>
+    <p:spTree>
+      <p:nvGrpSpPr>
+        <p:cNvPr id="1" name=""/>
+        <p:cNvGrpSpPr/>
+        <p:nvPr/>
+      </p:nvGrpSpPr>
+      <p:grpSpPr>
+        <a:xfrm>
+          <a:off x="0" y="0"/>
+          <a:ext cx="0" cy="0"/>
+          <a:chOff x="0" y="0"/>
+          <a:chExt cx="0" cy="0"/>
+        </a:xfrm>
+      </p:grpSpPr>
+      <p:sp>
+        <p:nvSpPr>
+          <p:cNvPr id="2" name="标题 1">
+            <a:extLst>
+              <a:ext uri="{FF2B5EF4-FFF2-40B4-BE49-F238E27FC236}">
+                <a16:creationId xmlns:a16="http://schemas.microsoft.com/office/drawing/2014/main" id="{D477B234-F68B-E445-D8A2-BD8A27460AD0}"/>
+              </a:ext>
+            </a:extLst>
+          </p:cNvPr>
+          <p:cNvSpPr>
+            <a:spLocks noGrp="1"/>
+          </p:cNvSpPr>
+          <p:nvPr>
+            <p:ph type="title"/>
+          </p:nvPr>
+        </p:nvSpPr>
+        <p:spPr/>
+        <p:txBody>
+          <a:bodyPr/>
+          <a:lstStyle/>
+          <a:p>
+            <a:r>
+              <a:rPr lang="en-US" dirty="0"/>
+              <a:t>Results</a:t>
+            </a:r>
+            <a:endParaRPr lang="en-CA" dirty="0"/>
+          </a:p>
+        </p:txBody>
+      </p:sp>
+      <p:sp>
+        <p:nvSpPr>
+          <p:cNvPr id="3" name="内容占位符 2">
+            <a:extLst>
+              <a:ext uri="{FF2B5EF4-FFF2-40B4-BE49-F238E27FC236}">
+                <a16:creationId xmlns:a16="http://schemas.microsoft.com/office/drawing/2014/main" id="{9E280BC6-86B8-2FB9-56A1-967D0B17A88C}"/>
+              </a:ext>
+            </a:extLst>
+          </p:cNvPr>
+          <p:cNvSpPr>
+            <a:spLocks noGrp="1"/>
+          </p:cNvSpPr>
+          <p:nvPr>
+            <p:ph idx="1"/>
+          </p:nvPr>
+        </p:nvSpPr>
+        <p:spPr/>
+        <p:txBody>
+          <a:bodyPr/>
+          <a:lstStyle/>
+          <a:p>
+            <a:r>
+              <a:rPr lang="en-US" dirty="0"/>
+              <a:t>Accuracy of English </a:t>
+            </a:r>
+            <a:r>
+              <a:rPr lang="en-US" dirty="0" err="1"/>
+              <a:t>testset</a:t>
+            </a:r>
+            <a:endParaRPr lang="en-US" dirty="0"/>
+          </a:p>
+          <a:p>
+            <a:endParaRPr lang="en-US" dirty="0"/>
+          </a:p>
+          <a:p>
+            <a:pPr marL="457200" lvl="1" indent="0">
+              <a:buNone/>
+            </a:pPr>
+            <a:r>
+              <a:rPr lang="en-US" dirty="0"/>
+              <a:t>ChatGpt-3.5		65%	(13/20)</a:t>
+            </a:r>
+          </a:p>
+          <a:p>
+            <a:pPr lvl="1"/>
+            <a:endParaRPr lang="en-US" dirty="0"/>
+          </a:p>
+          <a:p>
+            <a:pPr marL="457200" lvl="1" indent="0">
+              <a:buNone/>
+            </a:pPr>
+            <a:r>
+              <a:rPr lang="en-US" dirty="0"/>
+              <a:t>Gpt-4			95%	(19/20)</a:t>
+            </a:r>
+          </a:p>
+          <a:p>
+            <a:pPr lvl="1"/>
+            <a:endParaRPr lang="en-US" dirty="0"/>
+          </a:p>
+          <a:p>
+            <a:pPr marL="457200" lvl="1" indent="0">
+              <a:buNone/>
+            </a:pPr>
+            <a:r>
+              <a:rPr lang="en-US" dirty="0"/>
+              <a:t>Ernie-3.5			65%	(13/20)</a:t>
+            </a:r>
+          </a:p>
+          <a:p>
+            <a:pPr lvl="1"/>
+            <a:endParaRPr lang="en-US" dirty="0"/>
+          </a:p>
+          <a:p>
+            <a:pPr marL="457200" lvl="1" indent="0">
+              <a:buNone/>
+            </a:pPr>
+            <a:r>
+              <a:rPr lang="en-US" dirty="0"/>
+              <a:t>Ernie-4.0			85%	(17/20)</a:t>
+            </a:r>
+            <a:endParaRPr lang="en-CA" dirty="0"/>
+          </a:p>
+        </p:txBody>
+      </p:sp>
+    </p:spTree>
+    <p:extLst>
+      <p:ext uri="{BB962C8B-B14F-4D97-AF65-F5344CB8AC3E}">
+        <p14:creationId xmlns:p14="http://schemas.microsoft.com/office/powerpoint/2010/main" val="1682118802"/>
+      </p:ext>
+    </p:extLst>
+  </p:cSld>
+  <p:clrMapOvr>
+    <a:masterClrMapping/>
+  </p:clrMapOvr>
+</p:sld>
+</file>
+
+<file path=ppt/slides/slide14.xml><?xml version="1.0" encoding="utf-8"?>
+<p:sld xmlns:a="http://schemas.openxmlformats.org/drawingml/2006/main" xmlns:r="http://schemas.openxmlformats.org/officeDocument/2006/relationships" xmlns:p="http://schemas.openxmlformats.org/presentationml/2006/main">
+  <p:cSld>
+    <p:spTree>
+      <p:nvGrpSpPr>
+        <p:cNvPr id="1" name=""/>
+        <p:cNvGrpSpPr/>
+        <p:nvPr/>
+      </p:nvGrpSpPr>
+      <p:grpSpPr>
+        <a:xfrm>
+          <a:off x="0" y="0"/>
+          <a:ext cx="0" cy="0"/>
+          <a:chOff x="0" y="0"/>
+          <a:chExt cx="0" cy="0"/>
+        </a:xfrm>
+      </p:grpSpPr>
+      <p:sp>
+        <p:nvSpPr>
+          <p:cNvPr id="2" name="标题 1">
+            <a:extLst>
+              <a:ext uri="{FF2B5EF4-FFF2-40B4-BE49-F238E27FC236}">
+                <a16:creationId xmlns:a16="http://schemas.microsoft.com/office/drawing/2014/main" id="{D477B234-F68B-E445-D8A2-BD8A27460AD0}"/>
+              </a:ext>
+            </a:extLst>
+          </p:cNvPr>
+          <p:cNvSpPr>
+            <a:spLocks noGrp="1"/>
+          </p:cNvSpPr>
+          <p:nvPr>
+            <p:ph type="title"/>
+          </p:nvPr>
+        </p:nvSpPr>
+        <p:spPr/>
+        <p:txBody>
+          <a:bodyPr/>
+          <a:lstStyle/>
+          <a:p>
+            <a:r>
+              <a:rPr lang="en-US" dirty="0"/>
+              <a:t>Results</a:t>
+            </a:r>
+            <a:endParaRPr lang="en-CA" dirty="0"/>
+          </a:p>
+        </p:txBody>
+      </p:sp>
+      <p:sp>
+        <p:nvSpPr>
+          <p:cNvPr id="3" name="内容占位符 2">
+            <a:extLst>
+              <a:ext uri="{FF2B5EF4-FFF2-40B4-BE49-F238E27FC236}">
+                <a16:creationId xmlns:a16="http://schemas.microsoft.com/office/drawing/2014/main" id="{9E280BC6-86B8-2FB9-56A1-967D0B17A88C}"/>
+              </a:ext>
+            </a:extLst>
+          </p:cNvPr>
+          <p:cNvSpPr>
+            <a:spLocks noGrp="1"/>
+          </p:cNvSpPr>
+          <p:nvPr>
+            <p:ph idx="1"/>
+          </p:nvPr>
+        </p:nvSpPr>
+        <p:spPr/>
+        <p:txBody>
+          <a:bodyPr/>
+          <a:lstStyle/>
+          <a:p>
+            <a:r>
+              <a:rPr lang="en-US" dirty="0"/>
+              <a:t>Accuracy of Chinese </a:t>
+            </a:r>
+            <a:r>
+              <a:rPr lang="en-US" dirty="0" err="1"/>
+              <a:t>testset</a:t>
+            </a:r>
+            <a:endParaRPr lang="en-US" dirty="0"/>
+          </a:p>
+          <a:p>
+            <a:pPr lvl="1"/>
+            <a:endParaRPr lang="en-US" dirty="0"/>
+          </a:p>
+          <a:p>
+            <a:pPr marL="457200" lvl="1" indent="0">
+              <a:buNone/>
+            </a:pPr>
+            <a:r>
+              <a:rPr lang="en-US" dirty="0"/>
+              <a:t>ChatGpt-3.5		10%	(2/20)</a:t>
+            </a:r>
+          </a:p>
+          <a:p>
+            <a:pPr lvl="1"/>
+            <a:endParaRPr lang="en-US" dirty="0"/>
+          </a:p>
+          <a:p>
+            <a:pPr marL="457200" lvl="1" indent="0">
+              <a:buNone/>
+            </a:pPr>
+            <a:r>
+              <a:rPr lang="en-US" dirty="0"/>
+              <a:t>Gpt-4			75%	(15/20)</a:t>
+            </a:r>
+          </a:p>
+          <a:p>
+            <a:pPr lvl="1"/>
+            <a:endParaRPr lang="en-US" dirty="0"/>
+          </a:p>
+          <a:p>
+            <a:pPr marL="457200" lvl="1" indent="0">
+              <a:buNone/>
+            </a:pPr>
+            <a:r>
+              <a:rPr lang="en-US" dirty="0"/>
+              <a:t>Ernie-3.5			55%	(11/20)</a:t>
+            </a:r>
+          </a:p>
+          <a:p>
+            <a:pPr lvl="1"/>
+            <a:endParaRPr lang="en-US" dirty="0"/>
+          </a:p>
+          <a:p>
+            <a:pPr marL="457200" lvl="1" indent="0">
+              <a:buNone/>
+            </a:pPr>
+            <a:r>
+              <a:rPr lang="en-US" dirty="0"/>
+              <a:t>Ernie-4.0			55%	(11/20)</a:t>
+            </a:r>
+            <a:endParaRPr lang="en-CA" dirty="0"/>
+          </a:p>
+        </p:txBody>
+      </p:sp>
+    </p:spTree>
+    <p:extLst>
+      <p:ext uri="{BB962C8B-B14F-4D97-AF65-F5344CB8AC3E}">
+        <p14:creationId xmlns:p14="http://schemas.microsoft.com/office/powerpoint/2010/main" val="1699400422"/>
+      </p:ext>
+    </p:extLst>
+  </p:cSld>
+  <p:clrMapOvr>
+    <a:masterClrMapping/>
+  </p:clrMapOvr>
+</p:sld>
+</file>
+
+<file path=ppt/slides/slide15.xml><?xml version="1.0" encoding="utf-8"?>
+<p:sld xmlns:a="http://schemas.openxmlformats.org/drawingml/2006/main" xmlns:r="http://schemas.openxmlformats.org/officeDocument/2006/relationships" xmlns:p="http://schemas.openxmlformats.org/presentationml/2006/main">
+  <p:cSld>
+    <p:spTree>
+      <p:nvGrpSpPr>
+        <p:cNvPr id="1" name=""/>
+        <p:cNvGrpSpPr/>
+        <p:nvPr/>
+      </p:nvGrpSpPr>
+      <p:grpSpPr>
+        <a:xfrm>
+          <a:off x="0" y="0"/>
+          <a:ext cx="0" cy="0"/>
+          <a:chOff x="0" y="0"/>
+          <a:chExt cx="0" cy="0"/>
+        </a:xfrm>
+      </p:grpSpPr>
+      <p:sp>
+        <p:nvSpPr>
+          <p:cNvPr id="2" name="标题 1">
+            <a:extLst>
+              <a:ext uri="{FF2B5EF4-FFF2-40B4-BE49-F238E27FC236}">
+                <a16:creationId xmlns:a16="http://schemas.microsoft.com/office/drawing/2014/main" id="{D477B234-F68B-E445-D8A2-BD8A27460AD0}"/>
+              </a:ext>
+            </a:extLst>
+          </p:cNvPr>
+          <p:cNvSpPr>
+            <a:spLocks noGrp="1"/>
+          </p:cNvSpPr>
+          <p:nvPr>
+            <p:ph type="title"/>
+          </p:nvPr>
+        </p:nvSpPr>
+        <p:spPr/>
+        <p:txBody>
+          <a:bodyPr/>
+          <a:lstStyle/>
+          <a:p>
+            <a:r>
+              <a:rPr lang="en-US" dirty="0"/>
+              <a:t>Other Findings</a:t>
+            </a:r>
+            <a:endParaRPr lang="en-CA" dirty="0"/>
+          </a:p>
+        </p:txBody>
+      </p:sp>
+      <p:sp>
+        <p:nvSpPr>
+          <p:cNvPr id="3" name="内容占位符 2">
+            <a:extLst>
+              <a:ext uri="{FF2B5EF4-FFF2-40B4-BE49-F238E27FC236}">
+                <a16:creationId xmlns:a16="http://schemas.microsoft.com/office/drawing/2014/main" id="{9E280BC6-86B8-2FB9-56A1-967D0B17A88C}"/>
+              </a:ext>
+            </a:extLst>
+          </p:cNvPr>
+          <p:cNvSpPr>
+            <a:spLocks noGrp="1"/>
+          </p:cNvSpPr>
+          <p:nvPr>
+            <p:ph idx="1"/>
+          </p:nvPr>
+        </p:nvSpPr>
+        <p:spPr/>
+        <p:txBody>
+          <a:bodyPr/>
+          <a:lstStyle/>
+          <a:p>
+            <a:r>
+              <a:rPr lang="en-US" dirty="0"/>
+              <a:t>Accuracy on Chinese </a:t>
+            </a:r>
+            <a:r>
+              <a:rPr lang="en-US" dirty="0" err="1"/>
+              <a:t>testset</a:t>
+            </a:r>
+            <a:r>
+              <a:rPr lang="en-US" dirty="0"/>
+              <a:t> is significantly lower than English </a:t>
+            </a:r>
+            <a:r>
+              <a:rPr lang="en-US" dirty="0" err="1"/>
+              <a:t>testset</a:t>
+            </a:r>
+            <a:endParaRPr lang="en-US" dirty="0"/>
+          </a:p>
+          <a:p>
+            <a:pPr lvl="1"/>
+            <a:r>
+              <a:rPr lang="en-US" dirty="0"/>
+              <a:t>ChatGpt-3.5 is 65% correct in English and only 10% correct in Chinese</a:t>
+            </a:r>
+          </a:p>
+          <a:p>
+            <a:endParaRPr lang="en-US" dirty="0"/>
+          </a:p>
+          <a:p>
+            <a:r>
+              <a:rPr lang="en-US" dirty="0"/>
+              <a:t>Such </a:t>
+            </a:r>
+            <a:r>
+              <a:rPr lang="en-US" altLang="zh-CN" dirty="0"/>
+              <a:t>result</a:t>
+            </a:r>
+            <a:r>
+              <a:rPr lang="en-US" dirty="0"/>
+              <a:t> is expected, since there’s hint in the spell in English </a:t>
+            </a:r>
+            <a:r>
+              <a:rPr lang="en-US" dirty="0" err="1"/>
+              <a:t>testset</a:t>
+            </a:r>
+            <a:endParaRPr lang="en-US" dirty="0"/>
+          </a:p>
+          <a:p>
+            <a:endParaRPr lang="en-US" dirty="0"/>
+          </a:p>
+          <a:p>
+            <a:r>
+              <a:rPr lang="en-US" dirty="0"/>
+              <a:t>Examples:</a:t>
+            </a:r>
+          </a:p>
+          <a:p>
+            <a:pPr lvl="1"/>
+            <a:r>
+              <a:rPr lang="zh-CN" altLang="en-US" dirty="0"/>
+              <a:t>翰宝 </a:t>
+            </a:r>
+            <a:r>
+              <a:rPr lang="en-CA" altLang="zh-CN" dirty="0"/>
+              <a:t>&amp; </a:t>
+            </a:r>
+            <a:r>
+              <a:rPr lang="zh-CN" altLang="en-US" dirty="0"/>
+              <a:t>汉堡</a:t>
+            </a:r>
+            <a:endParaRPr lang="en-CA" altLang="zh-CN" dirty="0"/>
+          </a:p>
+          <a:p>
+            <a:pPr lvl="1"/>
+            <a:r>
+              <a:rPr lang="en-US" altLang="zh-CN" dirty="0" err="1"/>
+              <a:t>Kentroll</a:t>
+            </a:r>
+            <a:r>
+              <a:rPr lang="en-US" altLang="zh-CN" dirty="0"/>
+              <a:t> &amp; Control</a:t>
+            </a:r>
+            <a:endParaRPr lang="en-US" dirty="0"/>
+          </a:p>
+          <a:p>
+            <a:endParaRPr lang="en-US" dirty="0"/>
+          </a:p>
+        </p:txBody>
+      </p:sp>
+    </p:spTree>
+    <p:extLst>
+      <p:ext uri="{BB962C8B-B14F-4D97-AF65-F5344CB8AC3E}">
+        <p14:creationId xmlns:p14="http://schemas.microsoft.com/office/powerpoint/2010/main" val="2910943572"/>
+      </p:ext>
+    </p:extLst>
+  </p:cSld>
+  <p:clrMapOvr>
+    <a:masterClrMapping/>
+  </p:clrMapOvr>
+</p:sld>
+</file>
+
+<file path=ppt/slides/slide16.xml><?xml version="1.0" encoding="utf-8"?>
+<p:sld xmlns:a="http://schemas.openxmlformats.org/drawingml/2006/main" xmlns:r="http://schemas.openxmlformats.org/officeDocument/2006/relationships" xmlns:p="http://schemas.openxmlformats.org/presentationml/2006/main">
+  <p:cSld>
+    <p:spTree>
+      <p:nvGrpSpPr>
+        <p:cNvPr id="1" name=""/>
+        <p:cNvGrpSpPr/>
+        <p:nvPr/>
+      </p:nvGrpSpPr>
+      <p:grpSpPr>
+        <a:xfrm>
+          <a:off x="0" y="0"/>
+          <a:ext cx="0" cy="0"/>
+          <a:chOff x="0" y="0"/>
+          <a:chExt cx="0" cy="0"/>
+        </a:xfrm>
+      </p:grpSpPr>
+      <p:sp>
+        <p:nvSpPr>
+          <p:cNvPr id="2" name="标题 1">
+            <a:extLst>
+              <a:ext uri="{FF2B5EF4-FFF2-40B4-BE49-F238E27FC236}">
+                <a16:creationId xmlns:a16="http://schemas.microsoft.com/office/drawing/2014/main" id="{D477B234-F68B-E445-D8A2-BD8A27460AD0}"/>
+              </a:ext>
+            </a:extLst>
+          </p:cNvPr>
+          <p:cNvSpPr>
+            <a:spLocks noGrp="1"/>
+          </p:cNvSpPr>
+          <p:nvPr>
+            <p:ph type="title"/>
+          </p:nvPr>
+        </p:nvSpPr>
+        <p:spPr/>
+        <p:txBody>
+          <a:bodyPr/>
+          <a:lstStyle/>
+          <a:p>
+            <a:r>
+              <a:rPr lang="en-US" dirty="0"/>
+              <a:t>Other Findings</a:t>
+            </a:r>
+            <a:endParaRPr lang="en-CA" dirty="0"/>
+          </a:p>
+        </p:txBody>
+      </p:sp>
+      <p:sp>
+        <p:nvSpPr>
+          <p:cNvPr id="3" name="内容占位符 2">
+            <a:extLst>
+              <a:ext uri="{FF2B5EF4-FFF2-40B4-BE49-F238E27FC236}">
+                <a16:creationId xmlns:a16="http://schemas.microsoft.com/office/drawing/2014/main" id="{9E280BC6-86B8-2FB9-56A1-967D0B17A88C}"/>
+              </a:ext>
+            </a:extLst>
+          </p:cNvPr>
+          <p:cNvSpPr>
+            <a:spLocks noGrp="1"/>
+          </p:cNvSpPr>
+          <p:nvPr>
+            <p:ph idx="1"/>
+          </p:nvPr>
+        </p:nvSpPr>
+        <p:spPr/>
+        <p:txBody>
+          <a:bodyPr/>
+          <a:lstStyle/>
+          <a:p>
+            <a:r>
+              <a:rPr lang="en-US" dirty="0"/>
+              <a:t>The most common type of error is that LLM refuse to give an answer.</a:t>
+            </a:r>
+          </a:p>
+          <a:p>
+            <a:endParaRPr lang="en-US" dirty="0"/>
+          </a:p>
+          <a:p>
+            <a:r>
+              <a:rPr lang="en-US" dirty="0"/>
+              <a:t>ChatGPT-3.5: I don’t know!!!</a:t>
+            </a:r>
+          </a:p>
+          <a:p>
+            <a:r>
+              <a:rPr lang="en-US" dirty="0"/>
+              <a:t>ChatGPT-3.5: It’s so hard to tell!!!</a:t>
+            </a:r>
+          </a:p>
+          <a:p>
+            <a:r>
+              <a:rPr lang="en-US" dirty="0"/>
+              <a:t>ChatGPT-3.5: I won’t say anything before seeing more context!!!</a:t>
+            </a:r>
+          </a:p>
+          <a:p>
+            <a:endParaRPr lang="en-US" dirty="0"/>
+          </a:p>
+          <a:p>
+            <a:endParaRPr lang="en-US" dirty="0"/>
+          </a:p>
+          <a:p>
+            <a:endParaRPr lang="en-US" dirty="0"/>
+          </a:p>
+          <a:p>
+            <a:endParaRPr lang="en-US" dirty="0"/>
+          </a:p>
+          <a:p>
+            <a:endParaRPr lang="en-CA" dirty="0"/>
+          </a:p>
+        </p:txBody>
+      </p:sp>
+    </p:spTree>
+    <p:extLst>
+      <p:ext uri="{BB962C8B-B14F-4D97-AF65-F5344CB8AC3E}">
+        <p14:creationId xmlns:p14="http://schemas.microsoft.com/office/powerpoint/2010/main" val="734657857"/>
+      </p:ext>
+    </p:extLst>
+  </p:cSld>
+  <p:clrMapOvr>
+    <a:masterClrMapping/>
+  </p:clrMapOvr>
+</p:sld>
+</file>
+
+<file path=ppt/slides/slide17.xml><?xml version="1.0" encoding="utf-8"?>
+<p:sld xmlns:a="http://schemas.openxmlformats.org/drawingml/2006/main" xmlns:r="http://schemas.openxmlformats.org/officeDocument/2006/relationships" xmlns:p="http://schemas.openxmlformats.org/presentationml/2006/main">
+  <p:cSld>
+    <p:spTree>
+      <p:nvGrpSpPr>
+        <p:cNvPr id="1" name=""/>
+        <p:cNvGrpSpPr/>
+        <p:nvPr/>
+      </p:nvGrpSpPr>
+      <p:grpSpPr>
+        <a:xfrm>
+          <a:off x="0" y="0"/>
+          <a:ext cx="0" cy="0"/>
+          <a:chOff x="0" y="0"/>
+          <a:chExt cx="0" cy="0"/>
+        </a:xfrm>
+      </p:grpSpPr>
+      <p:sp>
+        <p:nvSpPr>
+          <p:cNvPr id="2" name="标题 1">
+            <a:extLst>
+              <a:ext uri="{FF2B5EF4-FFF2-40B4-BE49-F238E27FC236}">
+                <a16:creationId xmlns:a16="http://schemas.microsoft.com/office/drawing/2014/main" id="{D477B234-F68B-E445-D8A2-BD8A27460AD0}"/>
+              </a:ext>
+            </a:extLst>
+          </p:cNvPr>
+          <p:cNvSpPr>
+            <a:spLocks noGrp="1"/>
+          </p:cNvSpPr>
+          <p:nvPr>
+            <p:ph type="title"/>
+          </p:nvPr>
+        </p:nvSpPr>
+        <p:spPr/>
+        <p:txBody>
+          <a:bodyPr/>
+          <a:lstStyle/>
+          <a:p>
+            <a:r>
+              <a:rPr lang="en-US" dirty="0"/>
+              <a:t>Other Findings</a:t>
+            </a:r>
+            <a:endParaRPr lang="en-CA" dirty="0"/>
+          </a:p>
+        </p:txBody>
+      </p:sp>
+      <p:sp>
+        <p:nvSpPr>
+          <p:cNvPr id="3" name="内容占位符 2">
+            <a:extLst>
+              <a:ext uri="{FF2B5EF4-FFF2-40B4-BE49-F238E27FC236}">
+                <a16:creationId xmlns:a16="http://schemas.microsoft.com/office/drawing/2014/main" id="{9E280BC6-86B8-2FB9-56A1-967D0B17A88C}"/>
+              </a:ext>
+            </a:extLst>
+          </p:cNvPr>
+          <p:cNvSpPr>
+            <a:spLocks noGrp="1"/>
+          </p:cNvSpPr>
+          <p:nvPr>
+            <p:ph idx="1"/>
+          </p:nvPr>
+        </p:nvSpPr>
+        <p:spPr/>
+        <p:txBody>
+          <a:bodyPr/>
+          <a:lstStyle/>
+          <a:p>
+            <a:r>
+              <a:rPr lang="en-CA" dirty="0"/>
+              <a:t>Force it to answer, by asking again</a:t>
+            </a:r>
+          </a:p>
+        </p:txBody>
+      </p:sp>
+      <p:pic>
+        <p:nvPicPr>
+          <p:cNvPr id="5" name="图片 4">
+            <a:extLst>
+              <a:ext uri="{FF2B5EF4-FFF2-40B4-BE49-F238E27FC236}">
+                <a16:creationId xmlns:a16="http://schemas.microsoft.com/office/drawing/2014/main" id="{ECB93C29-E02A-73D5-EE4B-9DF85C90141E}"/>
+              </a:ext>
+            </a:extLst>
+          </p:cNvPr>
+          <p:cNvPicPr>
+            <a:picLocks noChangeAspect="1"/>
+          </p:cNvPicPr>
+          <p:nvPr/>
+        </p:nvPicPr>
+        <p:blipFill>
+          <a:blip r:embed="rId2">
+            <a:extLst>
+              <a:ext uri="{28A0092B-C50C-407E-A947-70E740481C1C}">
+                <a14:useLocalDpi xmlns:a14="http://schemas.microsoft.com/office/drawing/2010/main" val="0"/>
+              </a:ext>
+            </a:extLst>
+          </a:blip>
+          <a:stretch>
+            <a:fillRect/>
+          </a:stretch>
+        </p:blipFill>
+        <p:spPr>
+          <a:xfrm>
+            <a:off x="3356036" y="2397080"/>
+            <a:ext cx="5479927" cy="4351338"/>
+          </a:xfrm>
+          <a:prstGeom prst="rect">
+            <a:avLst/>
+          </a:prstGeom>
+        </p:spPr>
+      </p:pic>
+    </p:spTree>
+    <p:extLst>
+      <p:ext uri="{BB962C8B-B14F-4D97-AF65-F5344CB8AC3E}">
+        <p14:creationId xmlns:p14="http://schemas.microsoft.com/office/powerpoint/2010/main" val="3082297530"/>
+      </p:ext>
+    </p:extLst>
+  </p:cSld>
+  <p:clrMapOvr>
+    <a:masterClrMapping/>
+  </p:clrMapOvr>
+</p:sld>
+</file>
+
+<file path=ppt/slides/slide18.xml><?xml version="1.0" encoding="utf-8"?>
+<p:sld xmlns:a="http://schemas.openxmlformats.org/drawingml/2006/main" xmlns:r="http://schemas.openxmlformats.org/officeDocument/2006/relationships" xmlns:p="http://schemas.openxmlformats.org/presentationml/2006/main">
+  <p:cSld>
+    <p:spTree>
+      <p:nvGrpSpPr>
+        <p:cNvPr id="1" name=""/>
+        <p:cNvGrpSpPr/>
+        <p:nvPr/>
+      </p:nvGrpSpPr>
+      <p:grpSpPr>
+        <a:xfrm>
+          <a:off x="0" y="0"/>
+          <a:ext cx="0" cy="0"/>
+          <a:chOff x="0" y="0"/>
+          <a:chExt cx="0" cy="0"/>
+        </a:xfrm>
+      </p:grpSpPr>
+      <p:sp>
+        <p:nvSpPr>
+          <p:cNvPr id="2" name="标题 1">
+            <a:extLst>
+              <a:ext uri="{FF2B5EF4-FFF2-40B4-BE49-F238E27FC236}">
+                <a16:creationId xmlns:a16="http://schemas.microsoft.com/office/drawing/2014/main" id="{D477B234-F68B-E445-D8A2-BD8A27460AD0}"/>
+              </a:ext>
+            </a:extLst>
+          </p:cNvPr>
+          <p:cNvSpPr>
+            <a:spLocks noGrp="1"/>
+          </p:cNvSpPr>
+          <p:nvPr>
+            <p:ph type="title"/>
+          </p:nvPr>
+        </p:nvSpPr>
+        <p:spPr/>
+        <p:txBody>
+          <a:bodyPr/>
+          <a:lstStyle/>
+          <a:p>
+            <a:r>
+              <a:rPr lang="en-US" dirty="0"/>
+              <a:t>Other Findings</a:t>
+            </a:r>
+            <a:endParaRPr lang="en-CA" dirty="0"/>
+          </a:p>
+        </p:txBody>
+      </p:sp>
+      <p:sp>
+        <p:nvSpPr>
+          <p:cNvPr id="3" name="内容占位符 2">
+            <a:extLst>
+              <a:ext uri="{FF2B5EF4-FFF2-40B4-BE49-F238E27FC236}">
+                <a16:creationId xmlns:a16="http://schemas.microsoft.com/office/drawing/2014/main" id="{9E280BC6-86B8-2FB9-56A1-967D0B17A88C}"/>
+              </a:ext>
+            </a:extLst>
+          </p:cNvPr>
+          <p:cNvSpPr>
+            <a:spLocks noGrp="1"/>
+          </p:cNvSpPr>
+          <p:nvPr>
+            <p:ph idx="1"/>
+          </p:nvPr>
+        </p:nvSpPr>
+        <p:spPr/>
+        <p:txBody>
+          <a:bodyPr/>
+          <a:lstStyle/>
+          <a:p>
+            <a:r>
+              <a:rPr lang="en-CA" dirty="0"/>
+              <a:t>Sometimes asking again won’t work</a:t>
+            </a:r>
+          </a:p>
+          <a:p>
+            <a:endParaRPr lang="en-CA" dirty="0"/>
+          </a:p>
+          <a:p>
+            <a:r>
+              <a:rPr lang="en-CA" dirty="0"/>
+              <a:t>For the word “</a:t>
+            </a:r>
+            <a:r>
+              <a:rPr lang="zh-CN" altLang="en-US" dirty="0"/>
+              <a:t>宏律登</a:t>
+            </a:r>
+            <a:r>
+              <a:rPr lang="en-CA" dirty="0"/>
+              <a:t>” (meaning traffic lights), GPT-4 refuse to answer, no matter how many times it’s asked. ChatGPT-3.5 sometimes gives a wrong answer, sometimes correct</a:t>
+            </a:r>
+          </a:p>
+        </p:txBody>
+      </p:sp>
+    </p:spTree>
+    <p:extLst>
+      <p:ext uri="{BB962C8B-B14F-4D97-AF65-F5344CB8AC3E}">
+        <p14:creationId xmlns:p14="http://schemas.microsoft.com/office/powerpoint/2010/main" val="2906928436"/>
+      </p:ext>
+    </p:extLst>
+  </p:cSld>
+  <p:clrMapOvr>
+    <a:masterClrMapping/>
+  </p:clrMapOvr>
+</p:sld>
+</file>
+
+<file path=ppt/slides/slide19.xml><?xml version="1.0" encoding="utf-8"?>
+<p:sld xmlns:a="http://schemas.openxmlformats.org/drawingml/2006/main" xmlns:r="http://schemas.openxmlformats.org/officeDocument/2006/relationships" xmlns:p="http://schemas.openxmlformats.org/presentationml/2006/main">
+  <p:cSld>
+    <p:spTree>
+      <p:nvGrpSpPr>
+        <p:cNvPr id="1" name=""/>
+        <p:cNvGrpSpPr/>
+        <p:nvPr/>
+      </p:nvGrpSpPr>
+      <p:grpSpPr>
+        <a:xfrm>
+          <a:off x="0" y="0"/>
+          <a:ext cx="0" cy="0"/>
+          <a:chOff x="0" y="0"/>
+          <a:chExt cx="0" cy="0"/>
+        </a:xfrm>
+      </p:grpSpPr>
+      <p:sp>
+        <p:nvSpPr>
+          <p:cNvPr id="2" name="标题 1">
+            <a:extLst>
+              <a:ext uri="{FF2B5EF4-FFF2-40B4-BE49-F238E27FC236}">
+                <a16:creationId xmlns:a16="http://schemas.microsoft.com/office/drawing/2014/main" id="{C36A8755-31AA-D30F-B9E6-AFD1ECACA7CA}"/>
+              </a:ext>
+            </a:extLst>
+          </p:cNvPr>
+          <p:cNvSpPr>
+            <a:spLocks noGrp="1"/>
+          </p:cNvSpPr>
+          <p:nvPr>
+            <p:ph type="title"/>
+          </p:nvPr>
+        </p:nvSpPr>
+        <p:spPr/>
+        <p:txBody>
+          <a:bodyPr/>
+          <a:lstStyle/>
+          <a:p>
+            <a:r>
+              <a:rPr lang="en-US" dirty="0"/>
+              <a:t>Known Issues &amp; Future Works</a:t>
+            </a:r>
+            <a:endParaRPr lang="en-CA" dirty="0"/>
+          </a:p>
+        </p:txBody>
+      </p:sp>
+      <p:sp>
+        <p:nvSpPr>
+          <p:cNvPr id="3" name="内容占位符 2">
+            <a:extLst>
+              <a:ext uri="{FF2B5EF4-FFF2-40B4-BE49-F238E27FC236}">
+                <a16:creationId xmlns:a16="http://schemas.microsoft.com/office/drawing/2014/main" id="{C4E43D9F-CDAF-195F-FA7F-7E833706B543}"/>
+              </a:ext>
+            </a:extLst>
+          </p:cNvPr>
+          <p:cNvSpPr>
+            <a:spLocks noGrp="1"/>
+          </p:cNvSpPr>
+          <p:nvPr>
+            <p:ph idx="1"/>
+          </p:nvPr>
+        </p:nvSpPr>
+        <p:spPr/>
+        <p:txBody>
+          <a:bodyPr/>
+          <a:lstStyle/>
+          <a:p>
+            <a:r>
+              <a:rPr lang="en-CA" dirty="0"/>
+              <a:t>Cannot prevent LLMs to make random guess </a:t>
+            </a:r>
+            <a:r>
+              <a:rPr lang="en-CA"/>
+              <a:t>from context</a:t>
+            </a:r>
+          </a:p>
+          <a:p>
+            <a:endParaRPr lang="en-US" dirty="0"/>
+          </a:p>
+          <a:p>
+            <a:r>
+              <a:rPr lang="en-US" dirty="0"/>
+              <a:t>Need more test examples to make the results reliable</a:t>
+            </a:r>
+          </a:p>
+          <a:p>
+            <a:endParaRPr lang="en-US" dirty="0"/>
+          </a:p>
+          <a:p>
+            <a:r>
+              <a:rPr lang="en-US" dirty="0"/>
+              <a:t>Test on more LLMs</a:t>
+            </a:r>
+          </a:p>
+          <a:p>
+            <a:endParaRPr lang="en-US" dirty="0"/>
+          </a:p>
+        </p:txBody>
+      </p:sp>
+    </p:spTree>
+    <p:extLst>
+      <p:ext uri="{BB962C8B-B14F-4D97-AF65-F5344CB8AC3E}">
+        <p14:creationId xmlns:p14="http://schemas.microsoft.com/office/powerpoint/2010/main" val="888701830"/>
+      </p:ext>
+    </p:extLst>
+  </p:cSld>
+  <p:clrMapOvr>
+    <a:masterClrMapping/>
+  </p:clrMapOvr>
+</p:sld>
+</file>
+
 <file path=ppt/slides/slide2.xml><?xml version="1.0" encoding="utf-8"?>
 <p:sld xmlns:a="http://schemas.openxmlformats.org/drawingml/2006/main" xmlns:r="http://schemas.openxmlformats.org/officeDocument/2006/relationships" xmlns:p="http://schemas.openxmlformats.org/presentationml/2006/main">
   <p:cSld>
@@ -3975,12 +5475,151 @@
           <a:p>
             <a:endParaRPr lang="en-CA" dirty="0"/>
           </a:p>
+          <a:p>
+            <a:r>
+              <a:rPr lang="en-CA" dirty="0"/>
+              <a:t>This project is inspired by censorship in social media. People use manually created homophones to bypass censorship</a:t>
+            </a:r>
+          </a:p>
+          <a:p>
+            <a:endParaRPr lang="en-CA" dirty="0"/>
+          </a:p>
         </p:txBody>
       </p:sp>
     </p:spTree>
     <p:extLst>
       <p:ext uri="{BB962C8B-B14F-4D97-AF65-F5344CB8AC3E}">
         <p14:creationId xmlns:p14="http://schemas.microsoft.com/office/powerpoint/2010/main" val="133308439"/>
+      </p:ext>
+    </p:extLst>
+  </p:cSld>
+  <p:clrMapOvr>
+    <a:masterClrMapping/>
+  </p:clrMapOvr>
+</p:sld>
+</file>
+
+<file path=ppt/slides/slide20.xml><?xml version="1.0" encoding="utf-8"?>
+<p:sld xmlns:a="http://schemas.openxmlformats.org/drawingml/2006/main" xmlns:r="http://schemas.openxmlformats.org/officeDocument/2006/relationships" xmlns:p="http://schemas.openxmlformats.org/presentationml/2006/main">
+  <p:cSld>
+    <p:spTree>
+      <p:nvGrpSpPr>
+        <p:cNvPr id="1" name=""/>
+        <p:cNvGrpSpPr/>
+        <p:nvPr/>
+      </p:nvGrpSpPr>
+      <p:grpSpPr>
+        <a:xfrm>
+          <a:off x="0" y="0"/>
+          <a:ext cx="0" cy="0"/>
+          <a:chOff x="0" y="0"/>
+          <a:chExt cx="0" cy="0"/>
+        </a:xfrm>
+      </p:grpSpPr>
+      <p:sp>
+        <p:nvSpPr>
+          <p:cNvPr id="2" name="标题 1">
+            <a:extLst>
+              <a:ext uri="{FF2B5EF4-FFF2-40B4-BE49-F238E27FC236}">
+                <a16:creationId xmlns:a16="http://schemas.microsoft.com/office/drawing/2014/main" id="{C36A8755-31AA-D30F-B9E6-AFD1ECACA7CA}"/>
+              </a:ext>
+            </a:extLst>
+          </p:cNvPr>
+          <p:cNvSpPr>
+            <a:spLocks noGrp="1"/>
+          </p:cNvSpPr>
+          <p:nvPr>
+            <p:ph type="title"/>
+          </p:nvPr>
+        </p:nvSpPr>
+        <p:spPr>
+          <a:xfrm>
+            <a:off x="838200" y="2766218"/>
+            <a:ext cx="10515600" cy="1325563"/>
+          </a:xfrm>
+        </p:spPr>
+        <p:txBody>
+          <a:bodyPr/>
+          <a:lstStyle/>
+          <a:p>
+            <a:pPr algn="ctr"/>
+            <a:r>
+              <a:rPr lang="en-US" dirty="0"/>
+              <a:t>Q &amp; A</a:t>
+            </a:r>
+            <a:endParaRPr lang="en-CA" dirty="0"/>
+          </a:p>
+        </p:txBody>
+      </p:sp>
+    </p:spTree>
+    <p:extLst>
+      <p:ext uri="{BB962C8B-B14F-4D97-AF65-F5344CB8AC3E}">
+        <p14:creationId xmlns:p14="http://schemas.microsoft.com/office/powerpoint/2010/main" val="1464762613"/>
+      </p:ext>
+    </p:extLst>
+  </p:cSld>
+  <p:clrMapOvr>
+    <a:masterClrMapping/>
+  </p:clrMapOvr>
+</p:sld>
+</file>
+
+<file path=ppt/slides/slide21.xml><?xml version="1.0" encoding="utf-8"?>
+<p:sld xmlns:a="http://schemas.openxmlformats.org/drawingml/2006/main" xmlns:r="http://schemas.openxmlformats.org/officeDocument/2006/relationships" xmlns:p="http://schemas.openxmlformats.org/presentationml/2006/main">
+  <p:cSld>
+    <p:spTree>
+      <p:nvGrpSpPr>
+        <p:cNvPr id="1" name=""/>
+        <p:cNvGrpSpPr/>
+        <p:nvPr/>
+      </p:nvGrpSpPr>
+      <p:grpSpPr>
+        <a:xfrm>
+          <a:off x="0" y="0"/>
+          <a:ext cx="0" cy="0"/>
+          <a:chOff x="0" y="0"/>
+          <a:chExt cx="0" cy="0"/>
+        </a:xfrm>
+      </p:grpSpPr>
+      <p:sp>
+        <p:nvSpPr>
+          <p:cNvPr id="2" name="标题 1">
+            <a:extLst>
+              <a:ext uri="{FF2B5EF4-FFF2-40B4-BE49-F238E27FC236}">
+                <a16:creationId xmlns:a16="http://schemas.microsoft.com/office/drawing/2014/main" id="{C36A8755-31AA-D30F-B9E6-AFD1ECACA7CA}"/>
+              </a:ext>
+            </a:extLst>
+          </p:cNvPr>
+          <p:cNvSpPr>
+            <a:spLocks noGrp="1"/>
+          </p:cNvSpPr>
+          <p:nvPr>
+            <p:ph type="title"/>
+          </p:nvPr>
+        </p:nvSpPr>
+        <p:spPr>
+          <a:xfrm>
+            <a:off x="838200" y="2766218"/>
+            <a:ext cx="10515600" cy="1325563"/>
+          </a:xfrm>
+        </p:spPr>
+        <p:txBody>
+          <a:bodyPr/>
+          <a:lstStyle/>
+          <a:p>
+            <a:pPr algn="ctr"/>
+            <a:r>
+              <a:rPr lang="en-US" dirty="0"/>
+              <a:t>Thanks!</a:t>
+            </a:r>
+            <a:endParaRPr lang="en-CA" dirty="0"/>
+          </a:p>
+        </p:txBody>
+      </p:sp>
+    </p:spTree>
+    <p:extLst>
+      <p:ext uri="{BB962C8B-B14F-4D97-AF65-F5344CB8AC3E}">
+        <p14:creationId xmlns:p14="http://schemas.microsoft.com/office/powerpoint/2010/main" val="2188293445"/>
       </p:ext>
     </p:extLst>
   </p:cSld>
@@ -4057,14 +5696,158 @@
           <a:bodyPr/>
           <a:lstStyle/>
           <a:p>
-            <a:endParaRPr lang="en-CA"/>
+            <a:r>
+              <a:rPr lang="en-CA" b="0" i="0" dirty="0">
+                <a:solidFill>
+                  <a:srgbClr val="1F2328"/>
+                </a:solidFill>
+                <a:effectLst/>
+                <a:latin typeface="-apple-system"/>
+              </a:rPr>
+              <a:t>One exa</a:t>
+            </a:r>
+            <a:r>
+              <a:rPr lang="en-CA" dirty="0">
+                <a:solidFill>
+                  <a:srgbClr val="1F2328"/>
+                </a:solidFill>
+                <a:latin typeface="-apple-system"/>
+              </a:rPr>
+              <a:t>mple</a:t>
+            </a:r>
+          </a:p>
+          <a:p>
+            <a:endParaRPr lang="en-CA" b="0" i="0" dirty="0">
+              <a:solidFill>
+                <a:srgbClr val="1F2328"/>
+              </a:solidFill>
+              <a:effectLst/>
+              <a:latin typeface="-apple-system"/>
+            </a:endParaRPr>
+          </a:p>
+          <a:p>
+            <a:r>
+              <a:rPr lang="en-CA" dirty="0">
+                <a:solidFill>
+                  <a:srgbClr val="1F2328"/>
+                </a:solidFill>
+                <a:latin typeface="-apple-system"/>
+              </a:rPr>
+              <a:t>Assume the word ‘control’ is censored</a:t>
+            </a:r>
+          </a:p>
+          <a:p>
+            <a:pPr marL="457200" lvl="1" indent="0">
+              <a:buNone/>
+            </a:pPr>
+            <a:r>
+              <a:rPr lang="en-CA" b="0" i="0" dirty="0">
+                <a:solidFill>
+                  <a:srgbClr val="1F2328"/>
+                </a:solidFill>
+                <a:effectLst/>
+                <a:latin typeface="-apple-system"/>
+              </a:rPr>
+              <a:t>The driver lost </a:t>
+            </a:r>
+            <a:r>
+              <a:rPr lang="en-CA" b="0" i="0" dirty="0">
+                <a:solidFill>
+                  <a:srgbClr val="FF0000"/>
+                </a:solidFill>
+                <a:effectLst/>
+                <a:latin typeface="-apple-system"/>
+              </a:rPr>
+              <a:t>control</a:t>
+            </a:r>
+            <a:r>
+              <a:rPr lang="en-CA" b="0" i="0" dirty="0">
+                <a:solidFill>
+                  <a:srgbClr val="1F2328"/>
+                </a:solidFill>
+                <a:effectLst/>
+                <a:latin typeface="-apple-system"/>
+              </a:rPr>
+              <a:t> of the car</a:t>
+            </a:r>
+          </a:p>
+          <a:p>
+            <a:pPr marL="457200" lvl="1" indent="0">
+              <a:buNone/>
+            </a:pPr>
+            <a:r>
+              <a:rPr lang="en-CA" b="0" i="0" dirty="0">
+                <a:solidFill>
+                  <a:srgbClr val="1F2328"/>
+                </a:solidFill>
+                <a:effectLst/>
+                <a:latin typeface="-apple-system"/>
+              </a:rPr>
+              <a:t>The driver lost </a:t>
+            </a:r>
+            <a:r>
+              <a:rPr lang="en-CA" b="0" i="0" dirty="0" err="1">
+                <a:solidFill>
+                  <a:srgbClr val="FF0000"/>
+                </a:solidFill>
+                <a:effectLst/>
+                <a:latin typeface="-apple-system"/>
+              </a:rPr>
+              <a:t>kentroll</a:t>
+            </a:r>
+            <a:r>
+              <a:rPr lang="en-CA" b="0" i="0" dirty="0">
+                <a:solidFill>
+                  <a:srgbClr val="1F2328"/>
+                </a:solidFill>
+                <a:effectLst/>
+                <a:latin typeface="-apple-system"/>
+              </a:rPr>
+              <a:t> of the car</a:t>
+            </a:r>
+            <a:endParaRPr lang="en-CA" dirty="0">
+              <a:solidFill>
+                <a:srgbClr val="1F2328"/>
+              </a:solidFill>
+              <a:latin typeface="-apple-system"/>
+            </a:endParaRPr>
+          </a:p>
+          <a:p>
+            <a:endParaRPr lang="en-CA" dirty="0">
+              <a:solidFill>
+                <a:srgbClr val="1F2328"/>
+              </a:solidFill>
+              <a:latin typeface="-apple-system"/>
+            </a:endParaRPr>
+          </a:p>
+          <a:p>
+            <a:r>
+              <a:rPr lang="en-CA" dirty="0">
+                <a:solidFill>
+                  <a:srgbClr val="1F2328"/>
+                </a:solidFill>
+                <a:latin typeface="-apple-system"/>
+              </a:rPr>
+              <a:t>A manually created homophone needs to spell as different as possible, and sounds as similar as possible. It needs not being a valid word or making sense literally</a:t>
+            </a:r>
+          </a:p>
+          <a:p>
+            <a:endParaRPr lang="en-CA" dirty="0">
+              <a:solidFill>
+                <a:srgbClr val="1F2328"/>
+              </a:solidFill>
+              <a:latin typeface="-apple-system"/>
+            </a:endParaRPr>
+          </a:p>
+          <a:p>
+            <a:endParaRPr lang="en-CA" dirty="0"/>
           </a:p>
         </p:txBody>
       </p:sp>
     </p:spTree>
     <p:extLst>
       <p:ext uri="{BB962C8B-B14F-4D97-AF65-F5344CB8AC3E}">
-        <p14:creationId xmlns:p14="http://schemas.microsoft.com/office/powerpoint/2010/main" val="3145770658"/>
+        <p14:creationId xmlns:p14="http://schemas.microsoft.com/office/powerpoint/2010/main" val="69320045"/>
       </p:ext>
     </p:extLst>
   </p:cSld>
@@ -4096,7 +5879,7 @@
           <p:cNvPr id="2" name="标题 1">
             <a:extLst>
               <a:ext uri="{FF2B5EF4-FFF2-40B4-BE49-F238E27FC236}">
-                <a16:creationId xmlns:a16="http://schemas.microsoft.com/office/drawing/2014/main" id="{4F2BB1A5-E812-C234-3038-DF3DD0270520}"/>
+                <a16:creationId xmlns:a16="http://schemas.microsoft.com/office/drawing/2014/main" id="{7FEB2D9C-599A-0128-F1D3-B65F4FA83C48}"/>
               </a:ext>
             </a:extLst>
           </p:cNvPr>
@@ -4113,7 +5896,7 @@
           <a:lstStyle/>
           <a:p>
             <a:r>
-              <a:rPr lang="en-US" altLang="zh-CN" dirty="0"/>
+              <a:rPr lang="en-US" dirty="0"/>
               <a:t>Recapitulate</a:t>
             </a:r>
             <a:endParaRPr lang="en-CA" dirty="0"/>
@@ -4125,7 +5908,7 @@
           <p:cNvPr id="3" name="内容占位符 2">
             <a:extLst>
               <a:ext uri="{FF2B5EF4-FFF2-40B4-BE49-F238E27FC236}">
-                <a16:creationId xmlns:a16="http://schemas.microsoft.com/office/drawing/2014/main" id="{1751FDBE-7D7E-6324-EF48-7EA029CC1212}"/>
+                <a16:creationId xmlns:a16="http://schemas.microsoft.com/office/drawing/2014/main" id="{7AAB5925-08D8-15EB-C7B4-AC13B5D85154}"/>
               </a:ext>
             </a:extLst>
           </p:cNvPr>
@@ -4141,14 +5924,83 @@
           <a:bodyPr/>
           <a:lstStyle/>
           <a:p>
-            <a:endParaRPr lang="en-CA"/>
-          </a:p>
-        </p:txBody>
-      </p:sp>
+            <a:r>
+              <a:rPr lang="en-US" dirty="0"/>
+              <a:t>The goal of this project</a:t>
+            </a:r>
+          </a:p>
+          <a:p>
+            <a:pPr lvl="1"/>
+            <a:r>
+              <a:rPr lang="en-US" dirty="0"/>
+              <a:t>Build a </a:t>
+            </a:r>
+            <a:r>
+              <a:rPr lang="en-US" dirty="0" err="1"/>
+              <a:t>testset</a:t>
+            </a:r>
+            <a:r>
+              <a:rPr lang="en-US" dirty="0"/>
+              <a:t> about homophone recognition</a:t>
+            </a:r>
+          </a:p>
+          <a:p>
+            <a:pPr lvl="1"/>
+            <a:r>
+              <a:rPr lang="en-US" dirty="0"/>
+              <a:t>Measure state-of-the-art LLMs’ ability to comprehend homophones</a:t>
+            </a:r>
+            <a:endParaRPr lang="en-CA" dirty="0"/>
+          </a:p>
+          <a:p>
+            <a:pPr lvl="1"/>
+            <a:endParaRPr lang="en-US" dirty="0"/>
+          </a:p>
+          <a:p>
+            <a:endParaRPr lang="en-US" dirty="0"/>
+          </a:p>
+        </p:txBody>
+      </p:sp>
+      <p:pic>
+        <p:nvPicPr>
+          <p:cNvPr id="5" name="图片 4">
+            <a:extLst>
+              <a:ext uri="{FF2B5EF4-FFF2-40B4-BE49-F238E27FC236}">
+                <a16:creationId xmlns:a16="http://schemas.microsoft.com/office/drawing/2014/main" id="{35EE4DB5-075B-C0F6-75E7-A7EC329BFD91}"/>
+              </a:ext>
+            </a:extLst>
+          </p:cNvPr>
+          <p:cNvPicPr>
+            <a:picLocks noChangeAspect="1"/>
+          </p:cNvPicPr>
+          <p:nvPr/>
+        </p:nvPicPr>
+        <p:blipFill>
+          <a:blip r:embed="rId2">
+            <a:extLst>
+              <a:ext uri="{28A0092B-C50C-407E-A947-70E740481C1C}">
+                <a14:useLocalDpi xmlns:a14="http://schemas.microsoft.com/office/drawing/2010/main" val="0"/>
+              </a:ext>
+            </a:extLst>
+          </a:blip>
+          <a:stretch>
+            <a:fillRect/>
+          </a:stretch>
+        </p:blipFill>
+        <p:spPr>
+          <a:xfrm>
+            <a:off x="1962150" y="3235325"/>
+            <a:ext cx="8267700" cy="3076575"/>
+          </a:xfrm>
+          <a:prstGeom prst="rect">
+            <a:avLst/>
+          </a:prstGeom>
+        </p:spPr>
+      </p:pic>
     </p:spTree>
     <p:extLst>
       <p:ext uri="{BB962C8B-B14F-4D97-AF65-F5344CB8AC3E}">
-        <p14:creationId xmlns:p14="http://schemas.microsoft.com/office/powerpoint/2010/main" val="69320045"/>
+        <p14:creationId xmlns:p14="http://schemas.microsoft.com/office/powerpoint/2010/main" val="1244786952"/>
       </p:ext>
     </p:extLst>
   </p:cSld>
@@ -4197,8 +6049,8 @@
           <a:lstStyle/>
           <a:p>
             <a:r>
-              <a:rPr lang="en-US" altLang="zh-CN" dirty="0"/>
-              <a:t>Recapitulate</a:t>
+              <a:rPr lang="en-US" dirty="0"/>
+              <a:t>The Plan</a:t>
             </a:r>
             <a:endParaRPr lang="en-CA" dirty="0"/>
           </a:p>
@@ -4225,14 +6077,54 @@
           <a:bodyPr/>
           <a:lstStyle/>
           <a:p>
-            <a:endParaRPr lang="en-CA"/>
+            <a:r>
+              <a:rPr lang="en-US" dirty="0"/>
+              <a:t>Create 3 </a:t>
+            </a:r>
+            <a:r>
+              <a:rPr lang="en-US" dirty="0" err="1"/>
+              <a:t>testsets</a:t>
+            </a:r>
+            <a:r>
+              <a:rPr lang="en-US" dirty="0"/>
+              <a:t>, in English, Chinese and Spanish, respectively</a:t>
+            </a:r>
+          </a:p>
+          <a:p>
+            <a:endParaRPr lang="en-US" dirty="0"/>
+          </a:p>
+          <a:p>
+            <a:r>
+              <a:rPr lang="en-US" dirty="0"/>
+              <a:t>Each </a:t>
+            </a:r>
+            <a:r>
+              <a:rPr lang="en-US" dirty="0" err="1"/>
+              <a:t>testset</a:t>
+            </a:r>
+            <a:r>
+              <a:rPr lang="en-US" dirty="0"/>
+              <a:t> contains 100 examples</a:t>
+            </a:r>
+          </a:p>
+          <a:p>
+            <a:endParaRPr lang="en-US" dirty="0"/>
+          </a:p>
+          <a:p>
+            <a:r>
+              <a:rPr lang="en-US" dirty="0"/>
+              <a:t>Test on 5 state-of-the-art LLMs, to measure their ability to understand homophones</a:t>
+            </a:r>
+          </a:p>
+          <a:p>
+            <a:endParaRPr lang="en-CA" dirty="0"/>
           </a:p>
         </p:txBody>
       </p:sp>
     </p:spTree>
     <p:extLst>
       <p:ext uri="{BB962C8B-B14F-4D97-AF65-F5344CB8AC3E}">
-        <p14:creationId xmlns:p14="http://schemas.microsoft.com/office/powerpoint/2010/main" val="3758003306"/>
+        <p14:creationId xmlns:p14="http://schemas.microsoft.com/office/powerpoint/2010/main" val="3145770658"/>
       </p:ext>
     </p:extLst>
   </p:cSld>
@@ -4264,7 +6156,7 @@
           <p:cNvPr id="2" name="标题 1">
             <a:extLst>
               <a:ext uri="{FF2B5EF4-FFF2-40B4-BE49-F238E27FC236}">
-                <a16:creationId xmlns:a16="http://schemas.microsoft.com/office/drawing/2014/main" id="{4F2BB1A5-E812-C234-3038-DF3DD0270520}"/>
+                <a16:creationId xmlns:a16="http://schemas.microsoft.com/office/drawing/2014/main" id="{2466440E-B89A-F599-59EB-7B3DD1049711}"/>
               </a:ext>
             </a:extLst>
           </p:cNvPr>
@@ -4281,8 +6173,8 @@
           <a:lstStyle/>
           <a:p>
             <a:r>
-              <a:rPr lang="en-US" altLang="zh-CN" dirty="0"/>
-              <a:t>Recapitulate</a:t>
+              <a:rPr lang="en-US" dirty="0"/>
+              <a:t>The Plan</a:t>
             </a:r>
             <a:endParaRPr lang="en-CA" dirty="0"/>
           </a:p>
@@ -4293,7 +6185,7 @@
           <p:cNvPr id="3" name="内容占位符 2">
             <a:extLst>
               <a:ext uri="{FF2B5EF4-FFF2-40B4-BE49-F238E27FC236}">
-                <a16:creationId xmlns:a16="http://schemas.microsoft.com/office/drawing/2014/main" id="{1751FDBE-7D7E-6324-EF48-7EA029CC1212}"/>
+                <a16:creationId xmlns:a16="http://schemas.microsoft.com/office/drawing/2014/main" id="{0A688B9E-59B7-3A60-1488-09B251373759}"/>
               </a:ext>
             </a:extLst>
           </p:cNvPr>
@@ -4309,14 +6201,342 @@
           <a:bodyPr/>
           <a:lstStyle/>
           <a:p>
-            <a:endParaRPr lang="en-CA"/>
+            <a:r>
+              <a:rPr lang="en-US" dirty="0"/>
+              <a:t>We haven’t finished yet</a:t>
+            </a:r>
+          </a:p>
+          <a:p>
+            <a:endParaRPr lang="en-US" dirty="0"/>
+          </a:p>
+          <a:p>
+            <a:r>
+              <a:rPr lang="en-US" dirty="0"/>
+              <a:t>We’ve created 2 </a:t>
+            </a:r>
+            <a:r>
+              <a:rPr lang="en-US" dirty="0" err="1"/>
+              <a:t>testsets</a:t>
+            </a:r>
+            <a:r>
+              <a:rPr lang="en-US" dirty="0"/>
+              <a:t>, each of 20 examples, tested on 4 LLMs</a:t>
+            </a:r>
+          </a:p>
+          <a:p>
+            <a:endParaRPr lang="en-US" dirty="0"/>
+          </a:p>
+          <a:p>
+            <a:r>
+              <a:rPr lang="en-US" dirty="0"/>
+              <a:t>Fortunately, we already got some interesting findings to show</a:t>
+            </a:r>
           </a:p>
         </p:txBody>
       </p:sp>
     </p:spTree>
     <p:extLst>
       <p:ext uri="{BB962C8B-B14F-4D97-AF65-F5344CB8AC3E}">
-        <p14:creationId xmlns:p14="http://schemas.microsoft.com/office/powerpoint/2010/main" val="402022150"/>
+        <p14:creationId xmlns:p14="http://schemas.microsoft.com/office/powerpoint/2010/main" val="3194062797"/>
+      </p:ext>
+    </p:extLst>
+  </p:cSld>
+  <p:clrMapOvr>
+    <a:masterClrMapping/>
+  </p:clrMapOvr>
+</p:sld>
+</file>
+
+<file path=ppt/slides/slide7.xml><?xml version="1.0" encoding="utf-8"?>
+<p:sld xmlns:a="http://schemas.openxmlformats.org/drawingml/2006/main" xmlns:r="http://schemas.openxmlformats.org/officeDocument/2006/relationships" xmlns:p="http://schemas.openxmlformats.org/presentationml/2006/main">
+  <p:cSld>
+    <p:spTree>
+      <p:nvGrpSpPr>
+        <p:cNvPr id="1" name=""/>
+        <p:cNvGrpSpPr/>
+        <p:nvPr/>
+      </p:nvGrpSpPr>
+      <p:grpSpPr>
+        <a:xfrm>
+          <a:off x="0" y="0"/>
+          <a:ext cx="0" cy="0"/>
+          <a:chOff x="0" y="0"/>
+          <a:chExt cx="0" cy="0"/>
+        </a:xfrm>
+      </p:grpSpPr>
+      <p:sp>
+        <p:nvSpPr>
+          <p:cNvPr id="2" name="标题 1">
+            <a:extLst>
+              <a:ext uri="{FF2B5EF4-FFF2-40B4-BE49-F238E27FC236}">
+                <a16:creationId xmlns:a16="http://schemas.microsoft.com/office/drawing/2014/main" id="{C97B893A-DEB0-4FD1-541F-40DEBC88C875}"/>
+              </a:ext>
+            </a:extLst>
+          </p:cNvPr>
+          <p:cNvSpPr>
+            <a:spLocks noGrp="1"/>
+          </p:cNvSpPr>
+          <p:nvPr>
+            <p:ph type="title"/>
+          </p:nvPr>
+        </p:nvSpPr>
+        <p:spPr/>
+        <p:txBody>
+          <a:bodyPr/>
+          <a:lstStyle/>
+          <a:p>
+            <a:r>
+              <a:rPr lang="en-US" dirty="0"/>
+              <a:t>A Glimpse at the </a:t>
+            </a:r>
+            <a:r>
+              <a:rPr lang="en-US" dirty="0" err="1"/>
+              <a:t>Testset</a:t>
+            </a:r>
+            <a:endParaRPr lang="en-CA" dirty="0"/>
+          </a:p>
+        </p:txBody>
+      </p:sp>
+      <p:sp>
+        <p:nvSpPr>
+          <p:cNvPr id="3" name="内容占位符 2">
+            <a:extLst>
+              <a:ext uri="{FF2B5EF4-FFF2-40B4-BE49-F238E27FC236}">
+                <a16:creationId xmlns:a16="http://schemas.microsoft.com/office/drawing/2014/main" id="{7E43ADE0-2730-61CF-B7B8-E85936CED4C8}"/>
+              </a:ext>
+            </a:extLst>
+          </p:cNvPr>
+          <p:cNvSpPr>
+            <a:spLocks noGrp="1"/>
+          </p:cNvSpPr>
+          <p:nvPr>
+            <p:ph idx="1"/>
+          </p:nvPr>
+        </p:nvSpPr>
+        <p:spPr/>
+        <p:txBody>
+          <a:bodyPr/>
+          <a:lstStyle/>
+          <a:p>
+            <a:r>
+              <a:rPr lang="en-US" dirty="0"/>
+              <a:t>Our </a:t>
+            </a:r>
+            <a:r>
+              <a:rPr lang="en-US" dirty="0" err="1"/>
+              <a:t>testset</a:t>
+            </a:r>
+            <a:r>
+              <a:rPr lang="en-US" dirty="0"/>
+              <a:t> can be found on </a:t>
+            </a:r>
+            <a:r>
+              <a:rPr lang="en-US" dirty="0" err="1"/>
+              <a:t>Github</a:t>
+            </a:r>
+            <a:endParaRPr lang="en-US" dirty="0"/>
+          </a:p>
+          <a:p>
+            <a:endParaRPr lang="en-US" dirty="0"/>
+          </a:p>
+          <a:p>
+            <a:r>
+              <a:rPr lang="en-CA" dirty="0"/>
+              <a:t>https://github.com/LNQ1997/CPSC532V-project</a:t>
+            </a:r>
+          </a:p>
+        </p:txBody>
+      </p:sp>
+    </p:spTree>
+    <p:extLst>
+      <p:ext uri="{BB962C8B-B14F-4D97-AF65-F5344CB8AC3E}">
+        <p14:creationId xmlns:p14="http://schemas.microsoft.com/office/powerpoint/2010/main" val="1314530788"/>
+      </p:ext>
+    </p:extLst>
+  </p:cSld>
+  <p:clrMapOvr>
+    <a:masterClrMapping/>
+  </p:clrMapOvr>
+</p:sld>
+</file>
+
+<file path=ppt/slides/slide8.xml><?xml version="1.0" encoding="utf-8"?>
+<p:sld xmlns:a="http://schemas.openxmlformats.org/drawingml/2006/main" xmlns:r="http://schemas.openxmlformats.org/officeDocument/2006/relationships" xmlns:p="http://schemas.openxmlformats.org/presentationml/2006/main">
+  <p:cSld>
+    <p:spTree>
+      <p:nvGrpSpPr>
+        <p:cNvPr id="1" name=""/>
+        <p:cNvGrpSpPr/>
+        <p:nvPr/>
+      </p:nvGrpSpPr>
+      <p:grpSpPr>
+        <a:xfrm>
+          <a:off x="0" y="0"/>
+          <a:ext cx="0" cy="0"/>
+          <a:chOff x="0" y="0"/>
+          <a:chExt cx="0" cy="0"/>
+        </a:xfrm>
+      </p:grpSpPr>
+      <p:sp>
+        <p:nvSpPr>
+          <p:cNvPr id="2" name="标题 1">
+            <a:extLst>
+              <a:ext uri="{FF2B5EF4-FFF2-40B4-BE49-F238E27FC236}">
+                <a16:creationId xmlns:a16="http://schemas.microsoft.com/office/drawing/2014/main" id="{95644655-2F0D-FE26-F15B-0BA9B6F22437}"/>
+              </a:ext>
+            </a:extLst>
+          </p:cNvPr>
+          <p:cNvSpPr>
+            <a:spLocks noGrp="1"/>
+          </p:cNvSpPr>
+          <p:nvPr>
+            <p:ph type="title"/>
+          </p:nvPr>
+        </p:nvSpPr>
+        <p:spPr/>
+        <p:txBody>
+          <a:bodyPr/>
+          <a:lstStyle/>
+          <a:p>
+            <a:r>
+              <a:rPr lang="en-US" dirty="0"/>
+              <a:t>A Glimpse at the </a:t>
+            </a:r>
+            <a:r>
+              <a:rPr lang="en-US" dirty="0" err="1"/>
+              <a:t>Testset</a:t>
+            </a:r>
+            <a:endParaRPr lang="en-CA" dirty="0"/>
+          </a:p>
+        </p:txBody>
+      </p:sp>
+      <p:pic>
+        <p:nvPicPr>
+          <p:cNvPr id="5" name="图片 4">
+            <a:extLst>
+              <a:ext uri="{FF2B5EF4-FFF2-40B4-BE49-F238E27FC236}">
+                <a16:creationId xmlns:a16="http://schemas.microsoft.com/office/drawing/2014/main" id="{48F22112-6D71-22D9-22BF-3E7B9FAD7EED}"/>
+              </a:ext>
+            </a:extLst>
+          </p:cNvPr>
+          <p:cNvPicPr>
+            <a:picLocks noChangeAspect="1"/>
+          </p:cNvPicPr>
+          <p:nvPr/>
+        </p:nvPicPr>
+        <p:blipFill>
+          <a:blip r:embed="rId2"/>
+          <a:stretch>
+            <a:fillRect/>
+          </a:stretch>
+        </p:blipFill>
+        <p:spPr>
+          <a:xfrm>
+            <a:off x="1302759" y="1592446"/>
+            <a:ext cx="9586481" cy="4817696"/>
+          </a:xfrm>
+          <a:prstGeom prst="rect">
+            <a:avLst/>
+          </a:prstGeom>
+        </p:spPr>
+      </p:pic>
+    </p:spTree>
+    <p:extLst>
+      <p:ext uri="{BB962C8B-B14F-4D97-AF65-F5344CB8AC3E}">
+        <p14:creationId xmlns:p14="http://schemas.microsoft.com/office/powerpoint/2010/main" val="2921631087"/>
+      </p:ext>
+    </p:extLst>
+  </p:cSld>
+  <p:clrMapOvr>
+    <a:masterClrMapping/>
+  </p:clrMapOvr>
+</p:sld>
+</file>
+
+<file path=ppt/slides/slide9.xml><?xml version="1.0" encoding="utf-8"?>
+<p:sld xmlns:a="http://schemas.openxmlformats.org/drawingml/2006/main" xmlns:r="http://schemas.openxmlformats.org/officeDocument/2006/relationships" xmlns:p="http://schemas.openxmlformats.org/presentationml/2006/main">
+  <p:cSld>
+    <p:spTree>
+      <p:nvGrpSpPr>
+        <p:cNvPr id="1" name=""/>
+        <p:cNvGrpSpPr/>
+        <p:nvPr/>
+      </p:nvGrpSpPr>
+      <p:grpSpPr>
+        <a:xfrm>
+          <a:off x="0" y="0"/>
+          <a:ext cx="0" cy="0"/>
+          <a:chOff x="0" y="0"/>
+          <a:chExt cx="0" cy="0"/>
+        </a:xfrm>
+      </p:grpSpPr>
+      <p:sp>
+        <p:nvSpPr>
+          <p:cNvPr id="2" name="标题 1">
+            <a:extLst>
+              <a:ext uri="{FF2B5EF4-FFF2-40B4-BE49-F238E27FC236}">
+                <a16:creationId xmlns:a16="http://schemas.microsoft.com/office/drawing/2014/main" id="{95644655-2F0D-FE26-F15B-0BA9B6F22437}"/>
+              </a:ext>
+            </a:extLst>
+          </p:cNvPr>
+          <p:cNvSpPr>
+            <a:spLocks noGrp="1"/>
+          </p:cNvSpPr>
+          <p:nvPr>
+            <p:ph type="title"/>
+          </p:nvPr>
+        </p:nvSpPr>
+        <p:spPr/>
+        <p:txBody>
+          <a:bodyPr/>
+          <a:lstStyle/>
+          <a:p>
+            <a:r>
+              <a:rPr lang="en-US" dirty="0"/>
+              <a:t>A Glimpse at the </a:t>
+            </a:r>
+            <a:r>
+              <a:rPr lang="en-US" dirty="0" err="1"/>
+              <a:t>Testset</a:t>
+            </a:r>
+            <a:endParaRPr lang="en-CA" dirty="0"/>
+          </a:p>
+        </p:txBody>
+      </p:sp>
+      <p:pic>
+        <p:nvPicPr>
+          <p:cNvPr id="5" name="图片 4">
+            <a:extLst>
+              <a:ext uri="{FF2B5EF4-FFF2-40B4-BE49-F238E27FC236}">
+                <a16:creationId xmlns:a16="http://schemas.microsoft.com/office/drawing/2014/main" id="{5ADFACE8-7392-72C9-D0A8-05E0ECBFF50D}"/>
+              </a:ext>
+            </a:extLst>
+          </p:cNvPr>
+          <p:cNvPicPr>
+            <a:picLocks noChangeAspect="1"/>
+          </p:cNvPicPr>
+          <p:nvPr/>
+        </p:nvPicPr>
+        <p:blipFill>
+          <a:blip r:embed="rId2"/>
+          <a:stretch>
+            <a:fillRect/>
+          </a:stretch>
+        </p:blipFill>
+        <p:spPr>
+          <a:xfrm>
+            <a:off x="1693571" y="1587738"/>
+            <a:ext cx="8804858" cy="4782582"/>
+          </a:xfrm>
+          <a:prstGeom prst="rect">
+            <a:avLst/>
+          </a:prstGeom>
+        </p:spPr>
+      </p:pic>
+    </p:spTree>
+    <p:extLst>
+      <p:ext uri="{BB962C8B-B14F-4D97-AF65-F5344CB8AC3E}">
+        <p14:creationId xmlns:p14="http://schemas.microsoft.com/office/powerpoint/2010/main" val="148045813"/>
       </p:ext>
     </p:extLst>
   </p:cSld>

</xml_diff>